<commit_message>
updated plans and presentation for meeting 5
</commit_message>
<xml_diff>
--- a/Stargazer_Presentation_Semester2.pptx
+++ b/Stargazer_Presentation_Semester2.pptx
@@ -5,7 +5,7 @@
     <p:sldMasterId id="2147483684" r:id="rId1"/>
   </p:sldMasterIdLst>
   <p:notesMasterIdLst>
-    <p:notesMasterId r:id="rId23"/>
+    <p:notesMasterId r:id="rId20"/>
   </p:notesMasterIdLst>
   <p:sldIdLst>
     <p:sldId id="256" r:id="rId2"/>
@@ -17,18 +17,15 @@
     <p:sldId id="293" r:id="rId8"/>
     <p:sldId id="286" r:id="rId9"/>
     <p:sldId id="298" r:id="rId10"/>
-    <p:sldId id="285" r:id="rId11"/>
-    <p:sldId id="279" r:id="rId12"/>
-    <p:sldId id="261" r:id="rId13"/>
-    <p:sldId id="268" r:id="rId14"/>
-    <p:sldId id="280" r:id="rId15"/>
-    <p:sldId id="272" r:id="rId16"/>
-    <p:sldId id="283" r:id="rId17"/>
-    <p:sldId id="278" r:id="rId18"/>
-    <p:sldId id="297" r:id="rId19"/>
-    <p:sldId id="296" r:id="rId20"/>
-    <p:sldId id="273" r:id="rId21"/>
-    <p:sldId id="276" r:id="rId22"/>
+    <p:sldId id="279" r:id="rId11"/>
+    <p:sldId id="261" r:id="rId12"/>
+    <p:sldId id="268" r:id="rId13"/>
+    <p:sldId id="280" r:id="rId14"/>
+    <p:sldId id="272" r:id="rId15"/>
+    <p:sldId id="283" r:id="rId16"/>
+    <p:sldId id="278" r:id="rId17"/>
+    <p:sldId id="297" r:id="rId18"/>
+    <p:sldId id="296" r:id="rId19"/>
   </p:sldIdLst>
   <p:sldSz cx="9144000" cy="6858000" type="screen4x3"/>
   <p:notesSz cx="6858000" cy="9144000"/>
@@ -213,7 +210,7 @@
             <a:fld id="{2AAFEF68-1DE9-47A7-9FE3-8BA9D24E7EE3}" type="datetimeFigureOut">
               <a:rPr lang="en-US" smtClean="0"/>
               <a:pPr/>
-              <a:t>3/25/2010</a:t>
+              <a:t>3/29/2010</a:t>
             </a:fld>
             <a:endParaRPr lang="en-CA"/>
           </a:p>
@@ -607,83 +604,7 @@
           </a:bodyPr>
           <a:lstStyle/>
           <a:p>
-            <a:r>
-              <a:rPr lang="en-US" dirty="0" smtClean="0"/>
-              <a:t>ROB:</a:t>
-            </a:r>
-          </a:p>
-          <a:p>
-            <a:endParaRPr lang="en-US" dirty="0" smtClean="0"/>
-          </a:p>
-          <a:p>
-            <a:r>
-              <a:rPr lang="en-US" dirty="0" smtClean="0"/>
-              <a:t>For our versioning control tool we used Git.</a:t>
-            </a:r>
-            <a:r>
-              <a:rPr lang="en-US" baseline="0" dirty="0" smtClean="0"/>
-              <a:t> A lot of people nowadays are using Git for the reasons mentioned at the link. What drove me to choose </a:t>
-            </a:r>
-            <a:r>
-              <a:rPr lang="en-US" baseline="0" dirty="0" err="1" smtClean="0"/>
-              <a:t>git</a:t>
-            </a:r>
-            <a:r>
-              <a:rPr lang="en-US" baseline="0" dirty="0" smtClean="0"/>
-              <a:t> as our versioning tool was a presentation </a:t>
-            </a:r>
-            <a:r>
-              <a:rPr lang="en-US" baseline="0" dirty="0" err="1" smtClean="0"/>
-              <a:t>Linus</a:t>
-            </a:r>
-            <a:r>
-              <a:rPr lang="en-US" baseline="0" dirty="0" smtClean="0"/>
-              <a:t> </a:t>
-            </a:r>
-            <a:r>
-              <a:rPr lang="en-US" baseline="0" dirty="0" err="1" smtClean="0"/>
-              <a:t>Torvalds</a:t>
-            </a:r>
-            <a:r>
-              <a:rPr lang="en-US" baseline="0" dirty="0" smtClean="0"/>
-              <a:t> gave at a Google conference listing all the reasons which explains his reasons for developing this tool.</a:t>
-            </a:r>
-          </a:p>
-          <a:p>
-            <a:endParaRPr lang="en-US" baseline="0" dirty="0" smtClean="0"/>
-          </a:p>
-          <a:p>
-            <a:r>
-              <a:rPr lang="en-US" baseline="0" dirty="0" smtClean="0"/>
-              <a:t>It’s small, fast, easy to learn and can be used in a distributed environment. The reason why it’s so fast is because everything is local except when pushing and pulling commits to and from remote destinations which is the most time consuming activity and allows for work to be done offline as well. Network access isn’t necessary for most actions.</a:t>
-            </a:r>
-          </a:p>
-          <a:p>
-            <a:endParaRPr lang="en-US" baseline="0" dirty="0" smtClean="0"/>
-          </a:p>
-          <a:p>
-            <a:r>
-              <a:rPr lang="en-US" baseline="0" dirty="0" smtClean="0"/>
-              <a:t>We use a </a:t>
-            </a:r>
-            <a:r>
-              <a:rPr lang="en-US" baseline="0" dirty="0" err="1" smtClean="0"/>
-              <a:t>GitHub</a:t>
-            </a:r>
-            <a:r>
-              <a:rPr lang="en-US" baseline="0" dirty="0" smtClean="0"/>
-              <a:t> account to host our source code and acts as our remote repository and it can be seen at the following link location.</a:t>
-            </a:r>
-          </a:p>
-          <a:p>
-            <a:endParaRPr lang="en-US" baseline="0" dirty="0" smtClean="0"/>
-          </a:p>
-          <a:p>
-            <a:r>
-              <a:rPr lang="en-US" dirty="0" smtClean="0"/>
-              <a:t>http://www.youtube.com/watch?v=4XpnKHJAok8</a:t>
-            </a:r>
-            <a:endParaRPr lang="en-US" dirty="0"/>
+            <a:endParaRPr lang="en-CA" dirty="0"/>
           </a:p>
         </p:txBody>
       </p:sp>
@@ -765,276 +686,7 @@
           </a:bodyPr>
           <a:lstStyle/>
           <a:p>
-            <a:pPr marL="0" marR="0" indent="0" algn="l" defTabSz="914400" rtl="0" eaLnBrk="1" fontAlgn="auto" latinLnBrk="0" hangingPunct="1">
-              <a:lnSpc>
-                <a:spcPct val="100000"/>
-              </a:lnSpc>
-              <a:spcBef>
-                <a:spcPts val="0"/>
-              </a:spcBef>
-              <a:spcAft>
-                <a:spcPts val="0"/>
-              </a:spcAft>
-              <a:buClrTx/>
-              <a:buSzTx/>
-              <a:buFontTx/>
-              <a:buNone/>
-              <a:tabLst/>
-              <a:defRPr/>
-            </a:pPr>
-            <a:r>
-              <a:rPr lang="en-US" dirty="0" smtClean="0"/>
-              <a:t>ROB:</a:t>
-            </a:r>
-          </a:p>
-          <a:p>
-            <a:endParaRPr lang="en-CA" dirty="0" smtClean="0"/>
-          </a:p>
-          <a:p>
-            <a:pPr marL="0" marR="0" lvl="1" indent="0" algn="l" defTabSz="914400" rtl="0" eaLnBrk="1" fontAlgn="auto" latinLnBrk="0" hangingPunct="1">
-              <a:lnSpc>
-                <a:spcPct val="100000"/>
-              </a:lnSpc>
-              <a:spcBef>
-                <a:spcPts val="0"/>
-              </a:spcBef>
-              <a:spcAft>
-                <a:spcPts val="0"/>
-              </a:spcAft>
-              <a:buClrTx/>
-              <a:buSzTx/>
-              <a:buFontTx/>
-              <a:buNone/>
-              <a:tabLst/>
-              <a:defRPr/>
-            </a:pPr>
-            <a:r>
-              <a:rPr lang="en-CA" sz="1200" kern="1200" dirty="0" smtClean="0">
-                <a:solidFill>
-                  <a:schemeClr val="tx1"/>
-                </a:solidFill>
-                <a:latin typeface="+mn-lt"/>
-                <a:ea typeface="+mn-ea"/>
-                <a:cs typeface="+mn-cs"/>
-              </a:rPr>
-              <a:t>So here is how the</a:t>
-            </a:r>
-            <a:r>
-              <a:rPr lang="en-CA" sz="1200" kern="1200" baseline="0" dirty="0" smtClean="0">
-                <a:solidFill>
-                  <a:schemeClr val="tx1"/>
-                </a:solidFill>
-                <a:latin typeface="+mn-lt"/>
-                <a:ea typeface="+mn-ea"/>
-                <a:cs typeface="+mn-cs"/>
-              </a:rPr>
-              <a:t> architecture of our system will look like once all the components are completed. Right now, we still need to create the Java application which is a very large core of our system which will do the actual communication with the telescope and camera.</a:t>
-            </a:r>
-          </a:p>
-          <a:p>
-            <a:pPr marL="0" marR="0" lvl="1" indent="0" algn="l" defTabSz="914400" rtl="0" eaLnBrk="1" fontAlgn="auto" latinLnBrk="0" hangingPunct="1">
-              <a:lnSpc>
-                <a:spcPct val="100000"/>
-              </a:lnSpc>
-              <a:spcBef>
-                <a:spcPts val="0"/>
-              </a:spcBef>
-              <a:spcAft>
-                <a:spcPts val="0"/>
-              </a:spcAft>
-              <a:buClrTx/>
-              <a:buSzTx/>
-              <a:buFontTx/>
-              <a:buNone/>
-              <a:tabLst/>
-              <a:defRPr/>
-            </a:pPr>
-            <a:endParaRPr lang="en-CA" sz="1200" kern="1200" baseline="0" dirty="0" smtClean="0">
-              <a:solidFill>
-                <a:schemeClr val="tx1"/>
-              </a:solidFill>
-              <a:latin typeface="+mn-lt"/>
-              <a:ea typeface="+mn-ea"/>
-              <a:cs typeface="+mn-cs"/>
-            </a:endParaRPr>
-          </a:p>
-          <a:p>
-            <a:pPr marL="0" marR="0" lvl="1" indent="0" algn="l" defTabSz="914400" rtl="0" eaLnBrk="1" fontAlgn="auto" latinLnBrk="0" hangingPunct="1">
-              <a:lnSpc>
-                <a:spcPct val="100000"/>
-              </a:lnSpc>
-              <a:spcBef>
-                <a:spcPts val="0"/>
-              </a:spcBef>
-              <a:spcAft>
-                <a:spcPts val="0"/>
-              </a:spcAft>
-              <a:buClrTx/>
-              <a:buSzTx/>
-              <a:buFontTx/>
-              <a:buNone/>
-              <a:tabLst/>
-              <a:defRPr/>
-            </a:pPr>
-            <a:r>
-              <a:rPr lang="en-AU" sz="1200" kern="1200" dirty="0" smtClean="0">
-                <a:solidFill>
-                  <a:schemeClr val="tx1"/>
-                </a:solidFill>
-                <a:latin typeface="+mn-lt"/>
-                <a:ea typeface="+mn-ea"/>
-                <a:cs typeface="+mn-cs"/>
-              </a:rPr>
-              <a:t>Using a web browser, users will</a:t>
-            </a:r>
-            <a:r>
-              <a:rPr lang="en-AU" sz="1200" kern="1200" baseline="0" dirty="0" smtClean="0">
-                <a:solidFill>
-                  <a:schemeClr val="tx1"/>
-                </a:solidFill>
-                <a:latin typeface="+mn-lt"/>
-                <a:ea typeface="+mn-ea"/>
-                <a:cs typeface="+mn-cs"/>
-              </a:rPr>
-              <a:t> access the </a:t>
-            </a:r>
-            <a:r>
-              <a:rPr lang="en-AU" sz="1200" kern="1200" dirty="0" smtClean="0">
-                <a:solidFill>
-                  <a:schemeClr val="tx1"/>
-                </a:solidFill>
-                <a:latin typeface="+mn-lt"/>
-                <a:ea typeface="+mn-ea"/>
-                <a:cs typeface="+mn-cs"/>
-              </a:rPr>
-              <a:t>web application using</a:t>
-            </a:r>
-            <a:r>
-              <a:rPr lang="en-AU" sz="1200" kern="1200" baseline="0" dirty="0" smtClean="0">
-                <a:solidFill>
-                  <a:schemeClr val="tx1"/>
-                </a:solidFill>
-                <a:latin typeface="+mn-lt"/>
-                <a:ea typeface="+mn-ea"/>
-                <a:cs typeface="+mn-cs"/>
-              </a:rPr>
-              <a:t> either</a:t>
-            </a:r>
-            <a:r>
-              <a:rPr lang="en-AU" sz="1200" kern="1200" dirty="0" smtClean="0">
-                <a:solidFill>
-                  <a:schemeClr val="tx1"/>
-                </a:solidFill>
-                <a:latin typeface="+mn-lt"/>
-                <a:ea typeface="+mn-ea"/>
-                <a:cs typeface="+mn-cs"/>
-              </a:rPr>
-              <a:t> HTTP or HTTPS. Once they</a:t>
-            </a:r>
-            <a:r>
-              <a:rPr lang="en-AU" sz="1200" kern="1200" baseline="0" dirty="0" smtClean="0">
-                <a:solidFill>
-                  <a:schemeClr val="tx1"/>
-                </a:solidFill>
-                <a:latin typeface="+mn-lt"/>
-                <a:ea typeface="+mn-ea"/>
-                <a:cs typeface="+mn-cs"/>
-              </a:rPr>
-              <a:t> login they can create new schedules for positioning the telescope. Once a schedule is created, using a </a:t>
-            </a:r>
-            <a:r>
-              <a:rPr lang="en-AU" sz="1200" kern="1200" baseline="0" dirty="0" err="1" smtClean="0">
-                <a:solidFill>
-                  <a:schemeClr val="tx1"/>
-                </a:solidFill>
-                <a:latin typeface="+mn-lt"/>
-                <a:ea typeface="+mn-ea"/>
-                <a:cs typeface="+mn-cs"/>
-              </a:rPr>
-              <a:t>cronjob</a:t>
-            </a:r>
-            <a:r>
-              <a:rPr lang="en-AU" sz="1200" kern="1200" baseline="0" dirty="0" smtClean="0">
-                <a:solidFill>
-                  <a:schemeClr val="tx1"/>
-                </a:solidFill>
-                <a:latin typeface="+mn-lt"/>
-                <a:ea typeface="+mn-ea"/>
-                <a:cs typeface="+mn-cs"/>
-              </a:rPr>
-              <a:t> or some other scheduling tool, we will run a script at the specific time the telescope should position itself which will connect to the machine connected to the telescope using say SSH and then will be able to call the Java program with command line arguments to move at such and such a location for such and such a duration. The Java application will also compile the images and save it to that local disk.</a:t>
-            </a:r>
-            <a:endParaRPr lang="en-AU" sz="1200" kern="1200" dirty="0" smtClean="0">
-              <a:solidFill>
-                <a:schemeClr val="tx1"/>
-              </a:solidFill>
-              <a:latin typeface="+mn-lt"/>
-              <a:ea typeface="+mn-ea"/>
-              <a:cs typeface="+mn-cs"/>
-            </a:endParaRPr>
-          </a:p>
-          <a:p>
-            <a:pPr marL="0" marR="0" lvl="1" indent="0" algn="l" defTabSz="914400" rtl="0" eaLnBrk="1" fontAlgn="auto" latinLnBrk="0" hangingPunct="1">
-              <a:lnSpc>
-                <a:spcPct val="100000"/>
-              </a:lnSpc>
-              <a:spcBef>
-                <a:spcPts val="0"/>
-              </a:spcBef>
-              <a:spcAft>
-                <a:spcPts val="0"/>
-              </a:spcAft>
-              <a:buClrTx/>
-              <a:buSzTx/>
-              <a:buFontTx/>
-              <a:buNone/>
-              <a:tabLst/>
-              <a:defRPr/>
-            </a:pPr>
-            <a:endParaRPr lang="en-US" sz="1200" kern="1200" dirty="0" smtClean="0">
-              <a:solidFill>
-                <a:schemeClr val="tx1"/>
-              </a:solidFill>
-              <a:latin typeface="+mn-lt"/>
-              <a:ea typeface="+mn-ea"/>
-              <a:cs typeface="+mn-cs"/>
-            </a:endParaRPr>
-          </a:p>
-          <a:p>
-            <a:endParaRPr lang="en-US" dirty="0" smtClean="0"/>
-          </a:p>
-          <a:p>
-            <a:r>
-              <a:rPr lang="en-US" dirty="0" smtClean="0"/>
-              <a:t>Note: </a:t>
-            </a:r>
-          </a:p>
-          <a:p>
-            <a:pPr>
-              <a:buFontTx/>
-              <a:buChar char="-"/>
-            </a:pPr>
-            <a:r>
-              <a:rPr lang="en-US" dirty="0" smtClean="0"/>
-              <a:t> users may also</a:t>
-            </a:r>
-            <a:r>
-              <a:rPr lang="en-US" baseline="0" dirty="0" smtClean="0"/>
-              <a:t> connect to the web application via HTTPS</a:t>
-            </a:r>
-          </a:p>
-          <a:p>
-            <a:pPr>
-              <a:buFontTx/>
-              <a:buChar char="-"/>
-            </a:pPr>
-            <a:r>
-              <a:rPr lang="en-US" baseline="0" dirty="0" smtClean="0"/>
-              <a:t> application which controls the telescope and camera may be written in C#</a:t>
-            </a:r>
-          </a:p>
-          <a:p>
-            <a:endParaRPr lang="en-CA" dirty="0"/>
+            <a:endParaRPr lang="en-US" dirty="0"/>
           </a:p>
         </p:txBody>
       </p:sp>
@@ -1116,89 +768,6 @@
           </a:bodyPr>
           <a:lstStyle/>
           <a:p>
-            <a:pPr marL="0" marR="0" indent="0" algn="l" defTabSz="914400" rtl="0" eaLnBrk="1" fontAlgn="auto" latinLnBrk="0" hangingPunct="1">
-              <a:lnSpc>
-                <a:spcPct val="100000"/>
-              </a:lnSpc>
-              <a:spcBef>
-                <a:spcPts val="0"/>
-              </a:spcBef>
-              <a:spcAft>
-                <a:spcPts val="0"/>
-              </a:spcAft>
-              <a:buClrTx/>
-              <a:buSzTx/>
-              <a:buFontTx/>
-              <a:buNone/>
-              <a:tabLst/>
-              <a:defRPr/>
-            </a:pPr>
-            <a:r>
-              <a:rPr lang="en-US" dirty="0" smtClean="0"/>
-              <a:t>ROB:</a:t>
-            </a:r>
-          </a:p>
-          <a:p>
-            <a:endParaRPr lang="en-US" dirty="0" smtClean="0"/>
-          </a:p>
-          <a:p>
-            <a:r>
-              <a:rPr lang="en-US" dirty="0" smtClean="0"/>
-              <a:t>So because</a:t>
-            </a:r>
-            <a:r>
-              <a:rPr lang="en-US" baseline="0" dirty="0" smtClean="0"/>
-              <a:t> we use test-driven development, we need to have unit tests. </a:t>
-            </a:r>
-          </a:p>
-          <a:p>
-            <a:endParaRPr lang="en-US" baseline="0" dirty="0" smtClean="0"/>
-          </a:p>
-          <a:p>
-            <a:r>
-              <a:rPr lang="en-US" dirty="0" smtClean="0"/>
-              <a:t>Unit tests</a:t>
-            </a:r>
-            <a:r>
-              <a:rPr lang="en-US" baseline="0" dirty="0" smtClean="0"/>
-              <a:t> are </a:t>
-            </a:r>
-            <a:r>
-              <a:rPr lang="en-US" dirty="0" smtClean="0"/>
-              <a:t>“Black box” tests to ensure functionality correctness. A test suite is used to run all unit tests whenever new code is added to the system. Also, all tests must pass after the new code is added. </a:t>
-            </a:r>
-          </a:p>
-          <a:p>
-            <a:endParaRPr lang="en-US" dirty="0" smtClean="0"/>
-          </a:p>
-          <a:p>
-            <a:r>
-              <a:rPr lang="en-US" dirty="0" smtClean="0"/>
-              <a:t>For</a:t>
-            </a:r>
-            <a:r>
-              <a:rPr lang="en-US" baseline="0" dirty="0" smtClean="0"/>
-              <a:t> unit testing, we use the built-in ruby libraries which have functionality </a:t>
-            </a:r>
-            <a:r>
-              <a:rPr lang="en-US" baseline="0" dirty="0" err="1" smtClean="0"/>
-              <a:t>similiar</a:t>
-            </a:r>
-            <a:r>
-              <a:rPr lang="en-US" baseline="0" dirty="0" smtClean="0"/>
-              <a:t> to that of </a:t>
-            </a:r>
-            <a:r>
-              <a:rPr lang="en-US" baseline="0" dirty="0" err="1" smtClean="0"/>
-              <a:t>JUnit</a:t>
-            </a:r>
-            <a:r>
-              <a:rPr lang="en-US" baseline="0" dirty="0" smtClean="0"/>
-              <a:t> testing.</a:t>
-            </a:r>
-            <a:endParaRPr lang="en-US" dirty="0" smtClean="0"/>
-          </a:p>
-          <a:p>
             <a:endParaRPr lang="en-US" dirty="0"/>
           </a:p>
         </p:txBody>
@@ -1281,44 +850,6 @@
           </a:bodyPr>
           <a:lstStyle/>
           <a:p>
-            <a:r>
-              <a:rPr lang="en-CA" dirty="0" smtClean="0"/>
-              <a:t>Customers for giving</a:t>
-            </a:r>
-            <a:r>
-              <a:rPr lang="en-CA" baseline="0" dirty="0" smtClean="0"/>
-              <a:t> us such an interesting project and supplying us with the Meade telescope</a:t>
-            </a:r>
-          </a:p>
-          <a:p>
-            <a:r>
-              <a:rPr lang="en-CA" baseline="0" dirty="0" err="1" smtClean="0"/>
-              <a:t>Youry</a:t>
-            </a:r>
-            <a:r>
-              <a:rPr lang="en-CA" baseline="0" dirty="0" smtClean="0"/>
-              <a:t> for guiding us through the software development lifecycle</a:t>
-            </a:r>
-          </a:p>
-          <a:p>
-            <a:r>
-              <a:rPr lang="en-CA" baseline="0" dirty="0" smtClean="0"/>
-              <a:t>Dave </a:t>
-            </a:r>
-            <a:r>
-              <a:rPr lang="en-CA" baseline="0" dirty="0" err="1" smtClean="0"/>
-              <a:t>Goodall</a:t>
-            </a:r>
-            <a:r>
-              <a:rPr lang="en-CA" baseline="0" dirty="0" smtClean="0"/>
-              <a:t> for giving us a domain name for our project</a:t>
-            </a:r>
-          </a:p>
-          <a:p>
-            <a:r>
-              <a:rPr lang="en-CA" baseline="0" dirty="0" smtClean="0"/>
-              <a:t>Nokia for supplying us with two Nokia N97’s used for testing</a:t>
-            </a:r>
             <a:endParaRPr lang="en-US" dirty="0"/>
           </a:p>
         </p:txBody>
@@ -1341,7 +872,7 @@
             <a:fld id="{64EF572D-EF5B-479C-89C5-F647D7191839}" type="slidenum">
               <a:rPr lang="en-CA" smtClean="0"/>
               <a:pPr/>
-              <a:t>19</a:t>
+              <a:t>17</a:t>
             </a:fld>
             <a:endParaRPr lang="en-CA"/>
           </a:p>
@@ -1402,71 +933,48 @@
           <a:lstStyle/>
           <a:p>
             <a:r>
-              <a:rPr lang="en-US" dirty="0" smtClean="0"/>
-              <a:t>Web App:</a:t>
-            </a:r>
-          </a:p>
-          <a:p>
-            <a:r>
-              <a:rPr lang="en-US" dirty="0" smtClean="0"/>
-              <a:t>Show using different browsers</a:t>
-            </a:r>
-          </a:p>
-          <a:p>
-            <a:r>
-              <a:rPr lang="en-US" dirty="0" smtClean="0"/>
-              <a:t>Show using PC and handheld devices</a:t>
-            </a:r>
-          </a:p>
-          <a:p>
-            <a:endParaRPr lang="en-US" dirty="0" smtClean="0"/>
-          </a:p>
-          <a:p>
-            <a:r>
-              <a:rPr lang="en-US" dirty="0" smtClean="0"/>
-              <a:t>Also DEMO:</a:t>
-            </a:r>
-          </a:p>
-          <a:p>
-            <a:pPr>
-              <a:buFont typeface="Arial" charset="0"/>
-              <a:buChar char="•"/>
-            </a:pPr>
-            <a:r>
-              <a:rPr lang="en-US" baseline="0" dirty="0" smtClean="0"/>
-              <a:t>Meade </a:t>
-            </a:r>
-            <a:r>
-              <a:rPr lang="en-US" baseline="0" dirty="0" err="1" smtClean="0"/>
-              <a:t>Autostars</a:t>
-            </a:r>
-            <a:r>
-              <a:rPr lang="en-US" baseline="0" dirty="0" smtClean="0"/>
-              <a:t> program</a:t>
-            </a:r>
-          </a:p>
-          <a:p>
-            <a:pPr>
-              <a:buFont typeface="Arial" charset="0"/>
-              <a:buChar char="•"/>
-            </a:pPr>
-            <a:r>
-              <a:rPr lang="en-US" baseline="0" dirty="0" smtClean="0"/>
-              <a:t>Winstars2</a:t>
-            </a:r>
-          </a:p>
-          <a:p>
-            <a:pPr>
-              <a:buFont typeface="Arial" charset="0"/>
-              <a:buChar char="•"/>
-            </a:pPr>
-            <a:r>
-              <a:rPr lang="en-US" baseline="0" dirty="0" smtClean="0"/>
-              <a:t>Hardware (telescope)</a:t>
-            </a:r>
-            <a:endParaRPr lang="en-CA" dirty="0" smtClean="0"/>
-          </a:p>
-          <a:p>
+              <a:rPr lang="en-CA" dirty="0" smtClean="0"/>
+              <a:t>Customers for giving</a:t>
+            </a:r>
+            <a:r>
+              <a:rPr lang="en-CA" baseline="0" dirty="0" smtClean="0"/>
+              <a:t> us such an interesting project and supplying us with the Meade telescope</a:t>
+            </a:r>
+          </a:p>
+          <a:p>
+            <a:r>
+              <a:rPr lang="en-CA" baseline="0" dirty="0" err="1" smtClean="0"/>
+              <a:t>Youry</a:t>
+            </a:r>
+            <a:r>
+              <a:rPr lang="en-CA" baseline="0" dirty="0" smtClean="0"/>
+              <a:t> for guiding us through the software development lifecycle</a:t>
+            </a:r>
+          </a:p>
+          <a:p>
+            <a:r>
+              <a:rPr lang="en-CA" baseline="0" dirty="0" smtClean="0"/>
+              <a:t>Dave </a:t>
+            </a:r>
+            <a:r>
+              <a:rPr lang="en-CA" baseline="0" dirty="0" err="1" smtClean="0"/>
+              <a:t>Goodall</a:t>
+            </a:r>
+            <a:r>
+              <a:rPr lang="en-CA" baseline="0" dirty="0" smtClean="0"/>
+              <a:t> for giving us a domain name for our </a:t>
+            </a:r>
+            <a:r>
+              <a:rPr lang="en-CA" baseline="0" dirty="0" smtClean="0"/>
+              <a:t>project allowing outside access to our web server</a:t>
+            </a:r>
+            <a:endParaRPr lang="en-CA" baseline="0" dirty="0" smtClean="0"/>
+          </a:p>
+          <a:p>
+            <a:r>
+              <a:rPr lang="en-CA" baseline="0" dirty="0" smtClean="0"/>
+              <a:t>Nokia for supplying us with two Nokia N97’s used for testing</a:t>
+            </a:r>
             <a:endParaRPr lang="en-US" dirty="0"/>
           </a:p>
         </p:txBody>
@@ -1489,7 +997,7 @@
             <a:fld id="{64EF572D-EF5B-479C-89C5-F647D7191839}" type="slidenum">
               <a:rPr lang="en-CA" smtClean="0"/>
               <a:pPr/>
-              <a:t>20</a:t>
+              <a:t>18</a:t>
             </a:fld>
             <a:endParaRPr lang="en-CA"/>
           </a:p>
@@ -1549,106 +1057,6 @@
           </a:bodyPr>
           <a:lstStyle/>
           <a:p>
-            <a:pPr marL="0" marR="0" indent="0" algn="l" defTabSz="914400" rtl="0" eaLnBrk="1" fontAlgn="auto" latinLnBrk="0" hangingPunct="1">
-              <a:lnSpc>
-                <a:spcPct val="100000"/>
-              </a:lnSpc>
-              <a:spcBef>
-                <a:spcPts val="0"/>
-              </a:spcBef>
-              <a:spcAft>
-                <a:spcPts val="0"/>
-              </a:spcAft>
-              <a:buClrTx/>
-              <a:buSzTx/>
-              <a:buFontTx/>
-              <a:buNone/>
-              <a:tabLst/>
-              <a:defRPr/>
-            </a:pPr>
-            <a:r>
-              <a:rPr lang="en-US" dirty="0" smtClean="0"/>
-              <a:t>Mobile device connectivity: users should be able to easily access and use the web application through a handheld browser such as the </a:t>
-            </a:r>
-            <a:r>
-              <a:rPr lang="en-US" dirty="0" err="1" smtClean="0"/>
-              <a:t>iPhone’s</a:t>
-            </a:r>
-            <a:r>
-              <a:rPr lang="en-US" dirty="0" smtClean="0"/>
-              <a:t> Safari.</a:t>
-            </a:r>
-            <a:endParaRPr lang="en-CA" dirty="0" smtClean="0"/>
-          </a:p>
-          <a:p>
-            <a:endParaRPr lang="en-US" dirty="0" smtClean="0"/>
-          </a:p>
-          <a:p>
-            <a:r>
-              <a:rPr lang="en-US" dirty="0" smtClean="0"/>
-              <a:t>Authentication: users</a:t>
-            </a:r>
-            <a:r>
-              <a:rPr lang="en-US" baseline="0" dirty="0" smtClean="0"/>
-              <a:t> must have accounts in order to access the system in order to prevent outside, anonymous users from controlling the telescope.</a:t>
-            </a:r>
-          </a:p>
-          <a:p>
-            <a:endParaRPr lang="en-US" baseline="0" dirty="0" smtClean="0"/>
-          </a:p>
-          <a:p>
-            <a:r>
-              <a:rPr lang="en-US" baseline="0" dirty="0" smtClean="0"/>
-              <a:t>Authorization: there are two types of users. </a:t>
-            </a:r>
-            <a:r>
-              <a:rPr lang="en-US" baseline="0" dirty="0" err="1" smtClean="0"/>
-              <a:t>Admins</a:t>
-            </a:r>
-            <a:r>
-              <a:rPr lang="en-US" baseline="0" dirty="0" smtClean="0"/>
-              <a:t> have no restrictions and can manage users (add, edit, update), and can make changes to any schedule. Regular users can only add new schedules as well as edit and update their own schedules. They are also able to view other schedules, but not make any changes to them, and edit their own profile (change username, password, email).</a:t>
-            </a:r>
-          </a:p>
-          <a:p>
-            <a:endParaRPr lang="en-US" baseline="0" dirty="0" smtClean="0"/>
-          </a:p>
-          <a:p>
-            <a:r>
-              <a:rPr lang="en-US" baseline="0" dirty="0" smtClean="0"/>
-              <a:t>Optional SSL: the web application supports HTTPS but the web server uses a self-signed certificate (for now, since getting a certificate signed from a certificate authority i.e. </a:t>
-            </a:r>
-            <a:r>
-              <a:rPr lang="en-US" baseline="0" dirty="0" err="1" smtClean="0"/>
-              <a:t>Verisign</a:t>
-            </a:r>
-            <a:r>
-              <a:rPr lang="en-US" baseline="0" dirty="0" smtClean="0"/>
-              <a:t> costs money) so the user has the ability to encrypt their session although it is self-signed and not a mandatory requirement for the user to connect via HTTPS.</a:t>
-            </a:r>
-          </a:p>
-          <a:p>
-            <a:endParaRPr lang="en-US" baseline="0" dirty="0" smtClean="0"/>
-          </a:p>
-          <a:p>
-            <a:r>
-              <a:rPr lang="en-US" baseline="0" dirty="0" smtClean="0"/>
-              <a:t>Viewing images: an image belongs to a schedule; once an image is compiled, it will be added to the web application in case the user wishes to view it. Some image processing is done to create a medium-resolution and thumbnail image in order for it to make it more presentable to users when images are listed. They can be clicked for the full, high-resolution image to be shown.</a:t>
-            </a:r>
-          </a:p>
-          <a:p>
-            <a:endParaRPr lang="en-US" baseline="0" dirty="0" smtClean="0"/>
-          </a:p>
-          <a:p>
-            <a:r>
-              <a:rPr lang="en-US" baseline="0" dirty="0" smtClean="0"/>
-              <a:t>Online help: online help is added to further document how to correctly use the system if users are unsure as what they should do. However, the system is fairly intuitive so it should be intrinsically usable.</a:t>
-            </a:r>
-          </a:p>
-          <a:p>
-            <a:endParaRPr lang="en-US" baseline="0" dirty="0" smtClean="0"/>
-          </a:p>
-          <a:p>
             <a:endParaRPr lang="en-CA" dirty="0"/>
           </a:p>
         </p:txBody>
@@ -1745,16 +1153,6 @@
               <a:t>As of now, Sasha and Nan (our customers), use a manual process for achieving their goals of positioning the telescope and finding new celestial objects. </a:t>
             </a:r>
           </a:p>
-          <a:p>
-            <a:endParaRPr lang="en-US" dirty="0" smtClean="0"/>
-          </a:p>
-          <a:p>
-            <a:r>
-              <a:rPr lang="en-US" dirty="0" smtClean="0"/>
-              <a:t>Video showing images they have captured: http://www.youtube.com/user/lyuks</a:t>
-            </a:r>
-            <a:endParaRPr lang="en-US" dirty="0" smtClean="0"/>
-          </a:p>
         </p:txBody>
       </p:sp>
       <p:sp>
@@ -1937,22 +1335,6 @@
           </a:bodyPr>
           <a:lstStyle/>
           <a:p>
-            <a:r>
-              <a:rPr lang="en-US" dirty="0" err="1" smtClean="0"/>
-              <a:t>RailRoad</a:t>
-            </a:r>
-            <a:r>
-              <a:rPr lang="en-US" baseline="0" dirty="0" smtClean="0"/>
-              <a:t> = Ruby </a:t>
-            </a:r>
-            <a:r>
-              <a:rPr lang="en-US" baseline="0" dirty="0" err="1" smtClean="0"/>
-              <a:t>plugin</a:t>
-            </a:r>
-            <a:r>
-              <a:rPr lang="en-US" baseline="0" dirty="0" smtClean="0"/>
-              <a:t> for automatically generating domain models</a:t>
-            </a:r>
             <a:endParaRPr lang="en-US" dirty="0"/>
           </a:p>
         </p:txBody>
@@ -2134,99 +1516,7 @@
               <a:tabLst/>
               <a:defRPr/>
             </a:pPr>
-            <a:r>
-              <a:rPr lang="en-US" dirty="0" smtClean="0"/>
-              <a:t>ROB:</a:t>
-            </a:r>
-          </a:p>
-          <a:p>
-            <a:endParaRPr lang="en-US" dirty="0" smtClean="0"/>
-          </a:p>
-          <a:p>
-            <a:r>
-              <a:rPr lang="en-US" dirty="0" smtClean="0"/>
-              <a:t>Ruby on Rails is a framework for developing web applications</a:t>
-            </a:r>
-            <a:r>
-              <a:rPr lang="en-US" baseline="0" dirty="0" smtClean="0"/>
-              <a:t> using the Ruby language. Rails will be discussed more on the next slide.</a:t>
-            </a:r>
-          </a:p>
-          <a:p>
             <a:endParaRPr lang="en-US" baseline="0" dirty="0" smtClean="0"/>
-          </a:p>
-          <a:p>
-            <a:r>
-              <a:rPr lang="en-US" baseline="0" dirty="0" smtClean="0"/>
-              <a:t>We use CSS for presentation. We have different </a:t>
-            </a:r>
-            <a:r>
-              <a:rPr lang="en-US" baseline="0" dirty="0" err="1" smtClean="0"/>
-              <a:t>stylesheets</a:t>
-            </a:r>
-            <a:r>
-              <a:rPr lang="en-US" baseline="0" dirty="0" smtClean="0"/>
-              <a:t> depending on which media the user is connecting from: either from PC or from a handheld device.</a:t>
-            </a:r>
-          </a:p>
-          <a:p>
-            <a:endParaRPr lang="en-US" baseline="0" dirty="0" smtClean="0"/>
-          </a:p>
-          <a:p>
-            <a:r>
-              <a:rPr lang="en-US" baseline="0" dirty="0" smtClean="0"/>
-              <a:t>We use a Linux operating system to host our web application. In this case, we chose Fedora 11 which is a Red Hat based distribution.</a:t>
-            </a:r>
-          </a:p>
-          <a:p>
-            <a:endParaRPr lang="en-US" baseline="0" dirty="0" smtClean="0"/>
-          </a:p>
-          <a:p>
-            <a:r>
-              <a:rPr lang="en-US" baseline="0" dirty="0" smtClean="0"/>
-              <a:t>We use apache2 as our web server for our production environment, but most development is done on local computers like my laptop using Mongrel which I believe is written in Ruby and works well since its small and fast but doesn’t offer much in terms of configuration or stability which is why Apache2 is needed for a production environment. </a:t>
-            </a:r>
-          </a:p>
-          <a:p>
-            <a:endParaRPr lang="en-US" baseline="0" dirty="0" smtClean="0"/>
-          </a:p>
-          <a:p>
-            <a:r>
-              <a:rPr lang="en-US" baseline="0" dirty="0" smtClean="0"/>
-              <a:t>Also, for a database right now we use </a:t>
-            </a:r>
-            <a:r>
-              <a:rPr lang="en-US" baseline="0" dirty="0" err="1" smtClean="0"/>
-              <a:t>SQLite</a:t>
-            </a:r>
-            <a:r>
-              <a:rPr lang="en-US" baseline="0" dirty="0" smtClean="0"/>
-              <a:t> which is small, </a:t>
-            </a:r>
-            <a:r>
-              <a:rPr lang="en-US" baseline="0" dirty="0" err="1" smtClean="0"/>
-              <a:t>serverless</a:t>
-            </a:r>
-            <a:r>
-              <a:rPr lang="en-US" baseline="0" dirty="0" smtClean="0"/>
-              <a:t>, transactional database which requires zero configuration. It is very simple and doesn’t have many features so we may need to change this later to a database which can handle a larger data set for a production environment such as </a:t>
-            </a:r>
-            <a:r>
-              <a:rPr lang="en-US" baseline="0" dirty="0" err="1" smtClean="0"/>
-              <a:t>PostgreSQL</a:t>
-            </a:r>
-            <a:r>
-              <a:rPr lang="en-US" baseline="0" dirty="0" smtClean="0"/>
-              <a:t> which is the most powerful open source database out there at the moment. Other databases can be used such as </a:t>
-            </a:r>
-            <a:r>
-              <a:rPr lang="en-US" baseline="0" dirty="0" err="1" smtClean="0"/>
-              <a:t>MySQL</a:t>
-            </a:r>
-            <a:r>
-              <a:rPr lang="en-US" baseline="0" dirty="0" smtClean="0"/>
-              <a:t> or Oracle but I’d like to keep everything open source as much as possible as it would prevent any additional costs to the user.</a:t>
-            </a:r>
           </a:p>
         </p:txBody>
       </p:sp>
@@ -2325,99 +1615,7 @@
               <a:tabLst/>
               <a:defRPr/>
             </a:pPr>
-            <a:r>
-              <a:rPr lang="en-US" dirty="0" smtClean="0"/>
-              <a:t>ROB:</a:t>
-            </a:r>
-          </a:p>
-          <a:p>
-            <a:endParaRPr lang="en-US" dirty="0" smtClean="0"/>
-          </a:p>
-          <a:p>
-            <a:r>
-              <a:rPr lang="en-US" dirty="0" smtClean="0"/>
-              <a:t>Ruby on Rails is a framework for developing web applications</a:t>
-            </a:r>
-            <a:r>
-              <a:rPr lang="en-US" baseline="0" dirty="0" smtClean="0"/>
-              <a:t> using the Ruby language. Rails will be discussed more on the next slide.</a:t>
-            </a:r>
-          </a:p>
-          <a:p>
             <a:endParaRPr lang="en-US" baseline="0" dirty="0" smtClean="0"/>
-          </a:p>
-          <a:p>
-            <a:r>
-              <a:rPr lang="en-US" baseline="0" dirty="0" smtClean="0"/>
-              <a:t>We use CSS for presentation. We have different </a:t>
-            </a:r>
-            <a:r>
-              <a:rPr lang="en-US" baseline="0" dirty="0" err="1" smtClean="0"/>
-              <a:t>stylesheets</a:t>
-            </a:r>
-            <a:r>
-              <a:rPr lang="en-US" baseline="0" dirty="0" smtClean="0"/>
-              <a:t> depending on which media the user is connecting from: either from PC or from a handheld device.</a:t>
-            </a:r>
-          </a:p>
-          <a:p>
-            <a:endParaRPr lang="en-US" baseline="0" dirty="0" smtClean="0"/>
-          </a:p>
-          <a:p>
-            <a:r>
-              <a:rPr lang="en-US" baseline="0" dirty="0" smtClean="0"/>
-              <a:t>We use a Linux operating system to host our web application. In this case, we chose Fedora 11 which is a Red Hat based distribution.</a:t>
-            </a:r>
-          </a:p>
-          <a:p>
-            <a:endParaRPr lang="en-US" baseline="0" dirty="0" smtClean="0"/>
-          </a:p>
-          <a:p>
-            <a:r>
-              <a:rPr lang="en-US" baseline="0" dirty="0" smtClean="0"/>
-              <a:t>We use apache2 as our web server for our production environment, but most development is done on local computers like my laptop using Mongrel which I believe is written in Ruby and works well since its small and fast but doesn’t offer much in terms of configuration or stability which is why Apache2 is needed for a production environment. </a:t>
-            </a:r>
-          </a:p>
-          <a:p>
-            <a:endParaRPr lang="en-US" baseline="0" dirty="0" smtClean="0"/>
-          </a:p>
-          <a:p>
-            <a:r>
-              <a:rPr lang="en-US" baseline="0" dirty="0" smtClean="0"/>
-              <a:t>Also, for a database right now we use </a:t>
-            </a:r>
-            <a:r>
-              <a:rPr lang="en-US" baseline="0" dirty="0" err="1" smtClean="0"/>
-              <a:t>SQLite</a:t>
-            </a:r>
-            <a:r>
-              <a:rPr lang="en-US" baseline="0" dirty="0" smtClean="0"/>
-              <a:t> which is small, </a:t>
-            </a:r>
-            <a:r>
-              <a:rPr lang="en-US" baseline="0" dirty="0" err="1" smtClean="0"/>
-              <a:t>serverless</a:t>
-            </a:r>
-            <a:r>
-              <a:rPr lang="en-US" baseline="0" dirty="0" smtClean="0"/>
-              <a:t>, transactional database which requires zero configuration. It is very simple and doesn’t have many features so we may need to change this later to a database which can handle a larger data set for a production environment such as </a:t>
-            </a:r>
-            <a:r>
-              <a:rPr lang="en-US" baseline="0" dirty="0" err="1" smtClean="0"/>
-              <a:t>PostgreSQL</a:t>
-            </a:r>
-            <a:r>
-              <a:rPr lang="en-US" baseline="0" dirty="0" smtClean="0"/>
-              <a:t> which is the most powerful open source database out there at the moment. Other databases can be used such as </a:t>
-            </a:r>
-            <a:r>
-              <a:rPr lang="en-US" baseline="0" dirty="0" err="1" smtClean="0"/>
-              <a:t>MySQL</a:t>
-            </a:r>
-            <a:r>
-              <a:rPr lang="en-US" baseline="0" dirty="0" smtClean="0"/>
-              <a:t> or Oracle but I’d like to keep everything open source as much as possible as it would prevent any additional costs to the user.</a:t>
-            </a:r>
           </a:p>
         </p:txBody>
       </p:sp>
@@ -2495,190 +1693,9 @@
         <p:spPr/>
         <p:txBody>
           <a:bodyPr>
-            <a:normAutofit fontScale="92500" lnSpcReduction="20000"/>
+            <a:normAutofit/>
           </a:bodyPr>
           <a:lstStyle/>
-          <a:p>
-            <a:r>
-              <a:rPr lang="en-US" dirty="0" smtClean="0"/>
-              <a:t>ROB:</a:t>
-            </a:r>
-          </a:p>
-          <a:p>
-            <a:endParaRPr lang="en-US" dirty="0" smtClean="0"/>
-          </a:p>
-          <a:p>
-            <a:r>
-              <a:rPr lang="en-US" dirty="0" smtClean="0"/>
-              <a:t>Ruby on Rails is a framework for generating web applications quickly.</a:t>
-            </a:r>
-            <a:r>
-              <a:rPr lang="en-US" baseline="0" dirty="0" smtClean="0"/>
-              <a:t> It’s said that it can be up 10x more productive and efficient to use Rails over some other frameworks </a:t>
-            </a:r>
-            <a:r>
-              <a:rPr lang="en-US" baseline="0" dirty="0" err="1" smtClean="0"/>
-              <a:t>espicially</a:t>
-            </a:r>
-            <a:r>
-              <a:rPr lang="en-US" baseline="0" dirty="0" smtClean="0"/>
-              <a:t> those using Java as they usually require a lot of configuration and redundancy.</a:t>
-            </a:r>
-          </a:p>
-          <a:p>
-            <a:endParaRPr lang="en-US" baseline="0" dirty="0" smtClean="0"/>
-          </a:p>
-          <a:p>
-            <a:r>
-              <a:rPr lang="en-US" baseline="0" dirty="0" smtClean="0"/>
-              <a:t>It’s comparatively easy to learn. Some other frameworks take a long time to master such as the Java Spring framework, but there really isn’t anything magically that goes on behind the scenes as far as I can tell with Ruby on Rails. The most difficult part is learning the Ruby language which can take some time.</a:t>
-            </a:r>
-            <a:endParaRPr lang="en-US" dirty="0" smtClean="0"/>
-          </a:p>
-          <a:p>
-            <a:endParaRPr lang="en-US" dirty="0" smtClean="0"/>
-          </a:p>
-          <a:p>
-            <a:r>
-              <a:rPr lang="en-US" dirty="0" smtClean="0"/>
-              <a:t>Rails also enforces</a:t>
-            </a:r>
-            <a:r>
-              <a:rPr lang="en-US" baseline="0" dirty="0" smtClean="0"/>
-              <a:t> some patterns such as Model-View-Controller, which is usually just called MVC.</a:t>
-            </a:r>
-            <a:r>
-              <a:rPr lang="en-US" dirty="0" smtClean="0"/>
-              <a:t> </a:t>
-            </a:r>
-          </a:p>
-          <a:p>
-            <a:endParaRPr lang="en-US" dirty="0" smtClean="0"/>
-          </a:p>
-          <a:p>
-            <a:r>
-              <a:rPr lang="en-US" dirty="0" smtClean="0"/>
-              <a:t>In the case of Rails, models are primarily used for managing the rules of interaction with a corresponding database table. In most cases, one table in your database will correspond to one model in your application.</a:t>
-            </a:r>
-          </a:p>
-          <a:p>
-            <a:endParaRPr lang="en-US" dirty="0" smtClean="0"/>
-          </a:p>
-          <a:p>
-            <a:r>
-              <a:rPr lang="en-US" dirty="0" smtClean="0"/>
-              <a:t>In Rails, views are often HTML files with embedded Ruby code that performs tasks related solely to the presentation of the data. </a:t>
-            </a:r>
-          </a:p>
-          <a:p>
-            <a:endParaRPr lang="en-US" dirty="0" smtClean="0"/>
-          </a:p>
-          <a:p>
-            <a:r>
-              <a:rPr lang="en-US" dirty="0" smtClean="0"/>
-              <a:t>In Rails, controllers are responsible for processing the incoming requests from the web browser, interrogating the models for data, and passing that data on to the views for presentation.</a:t>
-            </a:r>
-          </a:p>
-          <a:p>
-            <a:endParaRPr lang="en-US" dirty="0" smtClean="0"/>
-          </a:p>
-          <a:p>
-            <a:r>
-              <a:rPr lang="en-US" dirty="0" smtClean="0"/>
-              <a:t>So</a:t>
-            </a:r>
-            <a:r>
-              <a:rPr lang="en-US" baseline="0" dirty="0" smtClean="0"/>
-              <a:t> basically w</a:t>
-            </a:r>
-            <a:r>
-              <a:rPr lang="en-US" dirty="0" smtClean="0"/>
-              <a:t>hat it does is:</a:t>
-            </a:r>
-          </a:p>
-          <a:p>
-            <a:r>
-              <a:rPr lang="en-US" dirty="0" smtClean="0"/>
-              <a:t>	- isolate the</a:t>
-            </a:r>
-            <a:r>
-              <a:rPr lang="en-US" baseline="0" dirty="0" smtClean="0"/>
-              <a:t> </a:t>
-            </a:r>
-            <a:r>
-              <a:rPr lang="en-US" dirty="0" smtClean="0"/>
-              <a:t>business logic from the user interface</a:t>
-            </a:r>
-          </a:p>
-          <a:p>
-            <a:r>
-              <a:rPr lang="en-US" dirty="0" smtClean="0"/>
-              <a:t>	- help</a:t>
-            </a:r>
-            <a:r>
-              <a:rPr lang="en-US" baseline="0" dirty="0" smtClean="0"/>
-              <a:t> keep code </a:t>
-            </a:r>
-            <a:r>
-              <a:rPr lang="en-US" dirty="0" smtClean="0"/>
-              <a:t>DRY. DRY means Don’t Repeat Yourself</a:t>
-            </a:r>
-            <a:r>
-              <a:rPr lang="en-US" baseline="0" dirty="0" smtClean="0"/>
-              <a:t> which basically means its a bad idea to duplicate code as it becomes harder to maintain and harder to understand.</a:t>
-            </a:r>
-            <a:endParaRPr lang="en-US" dirty="0" smtClean="0"/>
-          </a:p>
-          <a:p>
-            <a:r>
-              <a:rPr lang="en-US" dirty="0" smtClean="0"/>
-              <a:t>	-</a:t>
-            </a:r>
-            <a:r>
-              <a:rPr lang="en-US" baseline="0" dirty="0" smtClean="0"/>
-              <a:t> it also makes the applications easier to maintain as i</a:t>
-            </a:r>
-            <a:r>
-              <a:rPr lang="en-US" dirty="0" smtClean="0"/>
-              <a:t>t is clear where different types of code belong</a:t>
-            </a:r>
-          </a:p>
-          <a:p>
-            <a:endParaRPr lang="en-US" dirty="0" smtClean="0"/>
-          </a:p>
-          <a:p>
-            <a:r>
-              <a:rPr lang="en-US" dirty="0" smtClean="0"/>
-              <a:t>The Rails philosophy also includes several guiding principles such as:</a:t>
-            </a:r>
-          </a:p>
-          <a:p>
-            <a:r>
-              <a:rPr lang="en-US" dirty="0" smtClean="0"/>
-              <a:t>REST (which</a:t>
-            </a:r>
-            <a:r>
-              <a:rPr lang="en-US" baseline="0" dirty="0" smtClean="0"/>
-              <a:t> stands for Representational State Transfer) </a:t>
-            </a:r>
-            <a:r>
-              <a:rPr lang="en-US" dirty="0" smtClean="0"/>
-              <a:t>is the best pattern for web applications – organizing your application around resources and standard HTTP verbs is the fastest way to go. What this means is we use URLs</a:t>
-            </a:r>
-            <a:r>
-              <a:rPr lang="en-US" baseline="0" dirty="0" smtClean="0"/>
-              <a:t> to represent resources and then use HTTP actions to determine what kind of response the controller should have. </a:t>
-            </a:r>
-          </a:p>
-          <a:p>
-            <a:endParaRPr lang="en-US" dirty="0" smtClean="0"/>
-          </a:p>
-          <a:p>
-            <a:r>
-              <a:rPr lang="en-US" dirty="0" smtClean="0"/>
-              <a:t>Convention Over Configuration – means that Rails makes assumptions about what you want to do and how you’re going to do it, rather than letting you tweak every little thing through endless configuration files which eliminates a lot of redundancy and allows for greater productivity.</a:t>
-            </a:r>
-          </a:p>
           <a:p>
             <a:endParaRPr lang="en-US" dirty="0"/>
           </a:p>
@@ -2898,7 +1915,7 @@
             <a:fld id="{471E1C79-A119-44DE-84CD-391F73B5F415}" type="datetimeFigureOut">
               <a:rPr lang="en-US" smtClean="0"/>
               <a:pPr/>
-              <a:t>3/25/2010</a:t>
+              <a:t>3/29/2010</a:t>
             </a:fld>
             <a:endParaRPr lang="en-CA"/>
           </a:p>
@@ -3065,7 +2082,7 @@
             <a:fld id="{471E1C79-A119-44DE-84CD-391F73B5F415}" type="datetimeFigureOut">
               <a:rPr lang="en-US" smtClean="0"/>
               <a:pPr/>
-              <a:t>3/25/2010</a:t>
+              <a:t>3/29/2010</a:t>
             </a:fld>
             <a:endParaRPr lang="en-CA"/>
           </a:p>
@@ -3242,7 +2259,7 @@
             <a:fld id="{471E1C79-A119-44DE-84CD-391F73B5F415}" type="datetimeFigureOut">
               <a:rPr lang="en-US" smtClean="0"/>
               <a:pPr/>
-              <a:t>3/25/2010</a:t>
+              <a:t>3/29/2010</a:t>
             </a:fld>
             <a:endParaRPr lang="en-CA"/>
           </a:p>
@@ -3409,7 +2426,7 @@
             <a:fld id="{471E1C79-A119-44DE-84CD-391F73B5F415}" type="datetimeFigureOut">
               <a:rPr lang="en-US" smtClean="0"/>
               <a:pPr/>
-              <a:t>3/25/2010</a:t>
+              <a:t>3/29/2010</a:t>
             </a:fld>
             <a:endParaRPr lang="en-CA"/>
           </a:p>
@@ -3652,7 +2669,7 @@
             <a:fld id="{471E1C79-A119-44DE-84CD-391F73B5F415}" type="datetimeFigureOut">
               <a:rPr lang="en-US" smtClean="0"/>
               <a:pPr/>
-              <a:t>3/25/2010</a:t>
+              <a:t>3/29/2010</a:t>
             </a:fld>
             <a:endParaRPr lang="en-CA"/>
           </a:p>
@@ -3937,7 +2954,7 @@
             <a:fld id="{471E1C79-A119-44DE-84CD-391F73B5F415}" type="datetimeFigureOut">
               <a:rPr lang="en-US" smtClean="0"/>
               <a:pPr/>
-              <a:t>3/25/2010</a:t>
+              <a:t>3/29/2010</a:t>
             </a:fld>
             <a:endParaRPr lang="en-CA"/>
           </a:p>
@@ -4356,7 +3373,7 @@
             <a:fld id="{471E1C79-A119-44DE-84CD-391F73B5F415}" type="datetimeFigureOut">
               <a:rPr lang="en-US" smtClean="0"/>
               <a:pPr/>
-              <a:t>3/25/2010</a:t>
+              <a:t>3/29/2010</a:t>
             </a:fld>
             <a:endParaRPr lang="en-CA"/>
           </a:p>
@@ -4471,7 +3488,7 @@
             <a:fld id="{471E1C79-A119-44DE-84CD-391F73B5F415}" type="datetimeFigureOut">
               <a:rPr lang="en-US" smtClean="0"/>
               <a:pPr/>
-              <a:t>3/25/2010</a:t>
+              <a:t>3/29/2010</a:t>
             </a:fld>
             <a:endParaRPr lang="en-CA"/>
           </a:p>
@@ -4563,7 +3580,7 @@
             <a:fld id="{471E1C79-A119-44DE-84CD-391F73B5F415}" type="datetimeFigureOut">
               <a:rPr lang="en-US" smtClean="0"/>
               <a:pPr/>
-              <a:t>3/25/2010</a:t>
+              <a:t>3/29/2010</a:t>
             </a:fld>
             <a:endParaRPr lang="en-CA"/>
           </a:p>
@@ -4837,7 +3854,7 @@
             <a:fld id="{471E1C79-A119-44DE-84CD-391F73B5F415}" type="datetimeFigureOut">
               <a:rPr lang="en-US" smtClean="0"/>
               <a:pPr/>
-              <a:t>3/25/2010</a:t>
+              <a:t>3/29/2010</a:t>
             </a:fld>
             <a:endParaRPr lang="en-CA"/>
           </a:p>
@@ -5087,7 +4104,7 @@
             <a:fld id="{471E1C79-A119-44DE-84CD-391F73B5F415}" type="datetimeFigureOut">
               <a:rPr lang="en-US" smtClean="0"/>
               <a:pPr/>
-              <a:t>3/25/2010</a:t>
+              <a:t>3/29/2010</a:t>
             </a:fld>
             <a:endParaRPr lang="en-CA"/>
           </a:p>
@@ -5306,7 +4323,7 @@
             <a:fld id="{471E1C79-A119-44DE-84CD-391F73B5F415}" type="datetimeFigureOut">
               <a:rPr lang="en-US" smtClean="0"/>
               <a:pPr/>
-              <a:t>3/25/2010</a:t>
+              <a:t>3/29/2010</a:t>
             </a:fld>
             <a:endParaRPr lang="en-CA"/>
           </a:p>
@@ -5730,11 +4747,7 @@
             </a:br>
             <a:r>
               <a:rPr lang="en-US" sz="3200" dirty="0" smtClean="0"/>
-              <a:t>Automatic Telescope Control </a:t>
-            </a:r>
-            <a:r>
-              <a:rPr lang="en-US" sz="3200" dirty="0" smtClean="0"/>
-              <a:t>System</a:t>
+              <a:t>Automatic Telescope Control System</a:t>
             </a:r>
             <a:endParaRPr lang="en-CA" sz="8800" dirty="0"/>
           </a:p>
@@ -5775,20 +4788,13 @@
             </a:pPr>
             <a:r>
               <a:rPr lang="en-US" dirty="0" smtClean="0"/>
-              <a:t> Course</a:t>
-            </a:r>
-            <a:r>
-              <a:rPr lang="en-US" dirty="0" smtClean="0"/>
-              <a:t>: </a:t>
-            </a:r>
-            <a:r>
-              <a:rPr lang="en-US" dirty="0" smtClean="0"/>
-              <a:t>		COSC </a:t>
+              <a:t> Course: 		COSC </a:t>
             </a:r>
             <a:r>
               <a:rPr lang="en-US" dirty="0" smtClean="0"/>
               <a:t>470/471</a:t>
             </a:r>
+            <a:endParaRPr lang="en-US" dirty="0" smtClean="0"/>
           </a:p>
           <a:p>
             <a:pPr lvl="0" algn="l">
@@ -5796,15 +4802,7 @@
             </a:pPr>
             <a:r>
               <a:rPr lang="en-CA" dirty="0" smtClean="0"/>
-              <a:t> Instructor</a:t>
-            </a:r>
-            <a:r>
-              <a:rPr lang="en-CA" dirty="0" smtClean="0"/>
-              <a:t>: </a:t>
-            </a:r>
-            <a:r>
-              <a:rPr lang="en-CA" dirty="0" smtClean="0"/>
-              <a:t>	</a:t>
+              <a:t> Instructor: 	</a:t>
             </a:r>
             <a:r>
               <a:rPr lang="en-CA" dirty="0" err="1" smtClean="0"/>
@@ -5831,11 +4829,7 @@
             <a:pPr algn="l"/>
             <a:r>
               <a:rPr lang="en-US" dirty="0" smtClean="0"/>
-              <a:t> Students: 		</a:t>
-            </a:r>
-            <a:r>
-              <a:rPr lang="en-US" dirty="0" smtClean="0"/>
-              <a:t>Rob </a:t>
+              <a:t> Students: 		Rob </a:t>
             </a:r>
             <a:r>
               <a:rPr lang="en-US" dirty="0" err="1" smtClean="0"/>
@@ -5843,11 +4837,7 @@
             </a:r>
             <a:r>
               <a:rPr lang="en-US" dirty="0" smtClean="0"/>
-              <a:t>, Robert </a:t>
-            </a:r>
-            <a:r>
-              <a:rPr lang="en-US" dirty="0" smtClean="0"/>
-              <a:t>Smith</a:t>
+              <a:t>, Robert Smith</a:t>
             </a:r>
             <a:endParaRPr lang="en-CA" dirty="0"/>
           </a:p>
@@ -5911,7 +4901,11 @@
           <a:p>
             <a:r>
               <a:rPr lang="en-US" dirty="0" smtClean="0"/>
-              <a:t>Ruby on Rails</a:t>
+              <a:t>Versioning </a:t>
+            </a:r>
+            <a:r>
+              <a:rPr lang="en-US" dirty="0" smtClean="0"/>
+              <a:t>Control: GIT</a:t>
             </a:r>
             <a:endParaRPr lang="en-CA" dirty="0"/>
           </a:p>
@@ -5945,46 +4939,21 @@
           <a:p>
             <a:r>
               <a:rPr lang="en-US" dirty="0" smtClean="0"/>
-              <a:t>Comparatively </a:t>
-            </a:r>
-            <a:r>
-              <a:rPr lang="en-US" dirty="0" smtClean="0"/>
-              <a:t>easy to learn.</a:t>
+              <a:t>Fast</a:t>
+            </a:r>
+          </a:p>
+          <a:p>
+            <a:r>
+              <a:rPr lang="en-CA" dirty="0" smtClean="0"/>
+              <a:t>Small</a:t>
+            </a:r>
+          </a:p>
+          <a:p>
+            <a:r>
+              <a:rPr lang="en-CA" dirty="0" smtClean="0"/>
+              <a:t>Easy to learn</a:t>
             </a:r>
             <a:endParaRPr lang="en-US" dirty="0"/>
-          </a:p>
-          <a:p>
-            <a:r>
-              <a:rPr lang="en-US" dirty="0" smtClean="0"/>
-              <a:t>Enforces software </a:t>
-            </a:r>
-            <a:r>
-              <a:rPr lang="en-US" dirty="0" smtClean="0"/>
-              <a:t>patterns.</a:t>
-            </a:r>
-          </a:p>
-          <a:p>
-            <a:r>
-              <a:rPr lang="en-US" dirty="0" smtClean="0"/>
-              <a:t> </a:t>
-            </a:r>
-            <a:r>
-              <a:rPr lang="en-US" dirty="0" err="1" smtClean="0"/>
-              <a:t>RESTful</a:t>
-            </a:r>
-            <a:r>
-              <a:rPr lang="en-US" dirty="0" smtClean="0"/>
-              <a:t> </a:t>
-            </a:r>
-            <a:r>
-              <a:rPr lang="en-US" dirty="0" smtClean="0"/>
-              <a:t>architecture</a:t>
-            </a:r>
-            <a:r>
-              <a:rPr lang="en-US" dirty="0" smtClean="0"/>
-              <a:t>.</a:t>
-            </a:r>
-            <a:endParaRPr lang="en-CA" dirty="0"/>
           </a:p>
         </p:txBody>
       </p:sp>
@@ -5997,152 +4966,6 @@
 </file>
 
 <file path=ppt/slides/slide11.xml><?xml version="1.0" encoding="utf-8"?>
-<p:sld xmlns:a="http://schemas.openxmlformats.org/drawingml/2006/main" xmlns:r="http://schemas.openxmlformats.org/officeDocument/2006/relationships" xmlns:p="http://schemas.openxmlformats.org/presentationml/2006/main">
-  <p:cSld>
-    <p:spTree>
-      <p:nvGrpSpPr>
-        <p:cNvPr id="1" name=""/>
-        <p:cNvGrpSpPr/>
-        <p:nvPr/>
-      </p:nvGrpSpPr>
-      <p:grpSpPr>
-        <a:xfrm>
-          <a:off x="0" y="0"/>
-          <a:ext cx="0" cy="0"/>
-          <a:chOff x="0" y="0"/>
-          <a:chExt cx="0" cy="0"/>
-        </a:xfrm>
-      </p:grpSpPr>
-      <p:sp>
-        <p:nvSpPr>
-          <p:cNvPr id="2" name="Title 1"/>
-          <p:cNvSpPr>
-            <a:spLocks noGrp="1"/>
-          </p:cNvSpPr>
-          <p:nvPr>
-            <p:ph type="title"/>
-          </p:nvPr>
-        </p:nvSpPr>
-        <p:spPr>
-          <a:solidFill>
-            <a:srgbClr val="000000"/>
-          </a:solidFill>
-          <a:ln>
-            <a:solidFill>
-              <a:schemeClr val="accent1"/>
-            </a:solidFill>
-          </a:ln>
-        </p:spPr>
-        <p:txBody>
-          <a:bodyPr/>
-          <a:lstStyle/>
-          <a:p>
-            <a:r>
-              <a:rPr lang="en-US" dirty="0" smtClean="0"/>
-              <a:t>Versioning Control</a:t>
-            </a:r>
-            <a:endParaRPr lang="en-CA" dirty="0"/>
-          </a:p>
-        </p:txBody>
-      </p:sp>
-      <p:sp>
-        <p:nvSpPr>
-          <p:cNvPr id="3" name="Content Placeholder 2"/>
-          <p:cNvSpPr>
-            <a:spLocks noGrp="1"/>
-          </p:cNvSpPr>
-          <p:nvPr>
-            <p:ph idx="1"/>
-          </p:nvPr>
-        </p:nvSpPr>
-        <p:spPr>
-          <a:solidFill>
-            <a:srgbClr val="000000"/>
-          </a:solidFill>
-          <a:ln>
-            <a:solidFill>
-              <a:schemeClr val="accent1"/>
-            </a:solidFill>
-          </a:ln>
-        </p:spPr>
-        <p:txBody>
-          <a:bodyPr>
-            <a:normAutofit/>
-          </a:bodyPr>
-          <a:lstStyle/>
-          <a:p>
-            <a:r>
-              <a:rPr lang="en-US" dirty="0" smtClean="0"/>
-              <a:t>Used “Git”. Why?</a:t>
-            </a:r>
-          </a:p>
-          <a:p>
-            <a:pPr lvl="2"/>
-            <a:r>
-              <a:rPr lang="en-US" dirty="0" smtClean="0"/>
-              <a:t>Fast</a:t>
-            </a:r>
-            <a:endParaRPr lang="en-US" dirty="0" smtClean="0"/>
-          </a:p>
-          <a:p>
-            <a:pPr lvl="2"/>
-            <a:r>
-              <a:rPr lang="en-US" dirty="0" smtClean="0"/>
-              <a:t>Small</a:t>
-            </a:r>
-          </a:p>
-          <a:p>
-            <a:pPr lvl="2"/>
-            <a:r>
-              <a:rPr lang="en-US" dirty="0" smtClean="0"/>
-              <a:t>Easy to learn</a:t>
-            </a:r>
-          </a:p>
-          <a:p>
-            <a:pPr lvl="2"/>
-            <a:r>
-              <a:rPr lang="en-US" dirty="0" smtClean="0"/>
-              <a:t>Distributed</a:t>
-            </a:r>
-            <a:endParaRPr lang="en-US" dirty="0"/>
-          </a:p>
-          <a:p>
-            <a:endParaRPr lang="en-US" dirty="0" smtClean="0"/>
-          </a:p>
-          <a:p>
-            <a:r>
-              <a:rPr lang="en-US" dirty="0" err="1" smtClean="0"/>
-              <a:t>GitHub</a:t>
-            </a:r>
-            <a:r>
-              <a:rPr lang="en-US" dirty="0" smtClean="0"/>
-              <a:t> account, see: </a:t>
-            </a:r>
-            <a:r>
-              <a:rPr lang="en-US" dirty="0" smtClean="0">
-                <a:solidFill>
-                  <a:schemeClr val="bg1"/>
-                </a:solidFill>
-              </a:rPr>
-              <a:t>http://github.com/RedTeamCOSC470/Stargazer</a:t>
-            </a:r>
-            <a:endParaRPr lang="en-CA" dirty="0">
-              <a:solidFill>
-                <a:schemeClr val="bg1"/>
-              </a:solidFill>
-            </a:endParaRPr>
-          </a:p>
-        </p:txBody>
-      </p:sp>
-    </p:spTree>
-  </p:cSld>
-  <p:clrMapOvr>
-    <a:masterClrMapping/>
-  </p:clrMapOvr>
-</p:sld>
-</file>
-
-<file path=ppt/slides/slide12.xml><?xml version="1.0" encoding="utf-8"?>
 <p:sld xmlns:a="http://schemas.openxmlformats.org/drawingml/2006/main" xmlns:r="http://schemas.openxmlformats.org/officeDocument/2006/relationships" xmlns:p="http://schemas.openxmlformats.org/presentationml/2006/main">
   <p:cSld>
     <p:spTree>
@@ -6247,6 +5070,110 @@
 </p:sld>
 </file>
 
+<file path=ppt/slides/slide12.xml><?xml version="1.0" encoding="utf-8"?>
+<p:sld xmlns:a="http://schemas.openxmlformats.org/drawingml/2006/main" xmlns:r="http://schemas.openxmlformats.org/officeDocument/2006/relationships" xmlns:p="http://schemas.openxmlformats.org/presentationml/2006/main">
+  <p:cSld>
+    <p:spTree>
+      <p:nvGrpSpPr>
+        <p:cNvPr id="1" name=""/>
+        <p:cNvGrpSpPr/>
+        <p:nvPr/>
+      </p:nvGrpSpPr>
+      <p:grpSpPr>
+        <a:xfrm>
+          <a:off x="0" y="0"/>
+          <a:ext cx="0" cy="0"/>
+          <a:chOff x="0" y="0"/>
+          <a:chExt cx="0" cy="0"/>
+        </a:xfrm>
+      </p:grpSpPr>
+      <p:sp>
+        <p:nvSpPr>
+          <p:cNvPr id="2" name="Title 1"/>
+          <p:cNvSpPr>
+            <a:spLocks noGrp="1"/>
+          </p:cNvSpPr>
+          <p:nvPr>
+            <p:ph type="title"/>
+          </p:nvPr>
+        </p:nvSpPr>
+        <p:spPr>
+          <a:solidFill>
+            <a:srgbClr val="000000"/>
+          </a:solidFill>
+          <a:ln>
+            <a:solidFill>
+              <a:schemeClr val="accent1"/>
+            </a:solidFill>
+          </a:ln>
+        </p:spPr>
+        <p:txBody>
+          <a:bodyPr/>
+          <a:lstStyle/>
+          <a:p>
+            <a:r>
+              <a:rPr lang="en-US" dirty="0" smtClean="0"/>
+              <a:t>Testing</a:t>
+            </a:r>
+            <a:endParaRPr lang="en-CA" dirty="0"/>
+          </a:p>
+        </p:txBody>
+      </p:sp>
+      <p:sp>
+        <p:nvSpPr>
+          <p:cNvPr id="3" name="Content Placeholder 2"/>
+          <p:cNvSpPr>
+            <a:spLocks noGrp="1"/>
+          </p:cNvSpPr>
+          <p:nvPr>
+            <p:ph idx="1"/>
+          </p:nvPr>
+        </p:nvSpPr>
+        <p:spPr>
+          <a:solidFill>
+            <a:srgbClr val="000000"/>
+          </a:solidFill>
+          <a:ln>
+            <a:solidFill>
+              <a:schemeClr val="accent1"/>
+            </a:solidFill>
+          </a:ln>
+        </p:spPr>
+        <p:txBody>
+          <a:bodyPr>
+            <a:normAutofit/>
+          </a:bodyPr>
+          <a:lstStyle/>
+          <a:p>
+            <a:r>
+              <a:rPr lang="en-US" dirty="0" smtClean="0"/>
+              <a:t>Unit tests</a:t>
+            </a:r>
+          </a:p>
+          <a:p>
+            <a:r>
+              <a:rPr lang="en-CA" dirty="0" smtClean="0"/>
+              <a:t>Acceptance tests</a:t>
+            </a:r>
+            <a:endParaRPr lang="en-US" dirty="0" smtClean="0"/>
+          </a:p>
+        </p:txBody>
+      </p:sp>
+    </p:spTree>
+  </p:cSld>
+  <p:clrMapOvr>
+    <a:masterClrMapping/>
+  </p:clrMapOvr>
+  <p:timing>
+    <p:tnLst>
+      <p:par>
+        <p:cTn id="1" dur="indefinite" restart="never" nodeType="tmRoot"/>
+      </p:par>
+    </p:tnLst>
+  </p:timing>
+</p:sld>
+</file>
+
 <file path=ppt/slides/slide13.xml><?xml version="1.0" encoding="utf-8"?>
 <p:sld xmlns:a="http://schemas.openxmlformats.org/drawingml/2006/main" xmlns:r="http://schemas.openxmlformats.org/officeDocument/2006/relationships" xmlns:p="http://schemas.openxmlformats.org/presentationml/2006/main">
   <p:cSld>
@@ -6290,7 +5217,7 @@
           <a:p>
             <a:r>
               <a:rPr lang="en-US" dirty="0" smtClean="0"/>
-              <a:t>Testing</a:t>
+              <a:t>Project Timeline</a:t>
             </a:r>
             <a:endParaRPr lang="en-CA" dirty="0"/>
           </a:p>
@@ -6318,26 +5245,48 @@
         </p:spPr>
         <p:txBody>
           <a:bodyPr>
-            <a:normAutofit/>
+            <a:normAutofit lnSpcReduction="10000"/>
           </a:bodyPr>
           <a:lstStyle/>
           <a:p>
             <a:r>
               <a:rPr lang="en-US" dirty="0" smtClean="0"/>
-              <a:t>Unit </a:t>
-            </a:r>
-            <a:r>
-              <a:rPr lang="en-US" dirty="0" smtClean="0"/>
-              <a:t>tests</a:t>
-            </a:r>
+              <a:t>Iteration 5: Automated Scheduling and Telescope Positioning</a:t>
+            </a:r>
+          </a:p>
+          <a:p>
+            <a:r>
+              <a:rPr lang="en-US" dirty="0" smtClean="0"/>
+              <a:t>Iteration 6: Libraries and GUI Enhancements</a:t>
+            </a:r>
+          </a:p>
+          <a:p>
+            <a:r>
+              <a:rPr lang="en-US" dirty="0" smtClean="0"/>
+              <a:t>Iteration 7: Mobile Views</a:t>
+            </a:r>
+          </a:p>
+          <a:p>
+            <a:r>
+              <a:rPr lang="en-US" dirty="0" smtClean="0"/>
+              <a:t>Iteration 8: Image Capturing</a:t>
+            </a:r>
+          </a:p>
+          <a:p>
+            <a:r>
+              <a:rPr lang="en-US" dirty="0" smtClean="0"/>
+              <a:t>Iteration 9: The Final Release</a:t>
+            </a:r>
+          </a:p>
+          <a:p>
             <a:endParaRPr lang="en-US" dirty="0" smtClean="0"/>
           </a:p>
           <a:p>
             <a:r>
-              <a:rPr lang="en-CA" dirty="0" smtClean="0"/>
-              <a:t>Acceptance tests</a:t>
-            </a:r>
-            <a:endParaRPr lang="en-US" dirty="0" smtClean="0"/>
+              <a:rPr lang="en-US" dirty="0" smtClean="0"/>
+              <a:t>Each iteration = 2-3 weeks</a:t>
+            </a:r>
+            <a:endParaRPr lang="en-CA" dirty="0"/>
           </a:p>
         </p:txBody>
       </p:sp>
@@ -6346,13 +5295,6 @@
   <p:clrMapOvr>
     <a:masterClrMapping/>
   </p:clrMapOvr>
-  <p:timing>
-    <p:tnLst>
-      <p:par>
-        <p:cTn id="1" dur="indefinite" restart="never" nodeType="tmRoot"/>
-      </p:par>
-    </p:tnLst>
-  </p:timing>
 </p:sld>
 </file>
 
@@ -6399,7 +5341,7 @@
           <a:p>
             <a:r>
               <a:rPr lang="en-US" dirty="0" smtClean="0"/>
-              <a:t>Project Timeline</a:t>
+              <a:t>Project Evaluation and Metrics</a:t>
             </a:r>
             <a:endParaRPr lang="en-CA" dirty="0"/>
           </a:p>
@@ -6427,71 +5369,83 @@
         </p:spPr>
         <p:txBody>
           <a:bodyPr>
-            <a:normAutofit lnSpcReduction="10000"/>
+            <a:normAutofit fontScale="85000" lnSpcReduction="20000"/>
           </a:bodyPr>
           <a:lstStyle/>
           <a:p>
             <a:r>
               <a:rPr lang="en-US" dirty="0" smtClean="0"/>
-              <a:t>Iteration 5: Automated Scheduling and Telescope </a:t>
-            </a:r>
-            <a:r>
-              <a:rPr lang="en-US" dirty="0" smtClean="0"/>
-              <a:t>Positioning</a:t>
-            </a:r>
-          </a:p>
-          <a:p>
-            <a:r>
-              <a:rPr lang="en-US" dirty="0" smtClean="0"/>
-              <a:t>Iteration 6: Libraries and GUI </a:t>
-            </a:r>
-            <a:r>
-              <a:rPr lang="en-US" dirty="0" smtClean="0"/>
-              <a:t>Enhancements</a:t>
-            </a:r>
-          </a:p>
-          <a:p>
-            <a:r>
-              <a:rPr lang="en-US" dirty="0" smtClean="0"/>
-              <a:t>Iteration 7: Mobile </a:t>
-            </a:r>
-            <a:r>
-              <a:rPr lang="en-US" dirty="0" smtClean="0"/>
-              <a:t>Views</a:t>
-            </a:r>
-          </a:p>
-          <a:p>
-            <a:r>
-              <a:rPr lang="en-US" dirty="0" smtClean="0"/>
-              <a:t>Iteration 8: Image </a:t>
-            </a:r>
-            <a:r>
-              <a:rPr lang="en-US" dirty="0" smtClean="0"/>
-              <a:t>Capturing</a:t>
-            </a:r>
-          </a:p>
-          <a:p>
-            <a:r>
-              <a:rPr lang="en-US" dirty="0" smtClean="0"/>
-              <a:t>Iteration 9: The Final </a:t>
-            </a:r>
-            <a:r>
-              <a:rPr lang="en-US" dirty="0" smtClean="0"/>
-              <a:t>Release</a:t>
-            </a:r>
-          </a:p>
-          <a:p>
-            <a:endParaRPr lang="en-US" dirty="0" smtClean="0"/>
-          </a:p>
-          <a:p>
-            <a:r>
-              <a:rPr lang="en-US" dirty="0" smtClean="0"/>
-              <a:t>Each iteration = </a:t>
-            </a:r>
-            <a:r>
-              <a:rPr lang="en-US" dirty="0" smtClean="0"/>
-              <a:t>2-3 weeks</a:t>
-            </a:r>
+              <a:t>Time spent: (1 unit = 15 minutes)</a:t>
+            </a:r>
+          </a:p>
+          <a:p>
+            <a:r>
+              <a:rPr lang="en-US" dirty="0" smtClean="0"/>
+              <a:t>Total time:  [??] units</a:t>
+            </a:r>
+          </a:p>
+          <a:p>
+            <a:endParaRPr lang="en-US" dirty="0"/>
+          </a:p>
+          <a:p>
+            <a:r>
+              <a:rPr lang="en-US" dirty="0" smtClean="0"/>
+              <a:t>Coding:</a:t>
+            </a:r>
+          </a:p>
+          <a:p>
+            <a:pPr lvl="1"/>
+            <a:r>
+              <a:rPr lang="en-US" dirty="0" smtClean="0"/>
+              <a:t>Models: [??] </a:t>
+            </a:r>
+          </a:p>
+          <a:p>
+            <a:pPr lvl="1"/>
+            <a:r>
+              <a:rPr lang="en-US" dirty="0" smtClean="0"/>
+              <a:t>Views: [??] </a:t>
+            </a:r>
+          </a:p>
+          <a:p>
+            <a:pPr lvl="1"/>
+            <a:r>
+              <a:rPr lang="en-US" dirty="0" smtClean="0"/>
+              <a:t>Controllers: [??] </a:t>
+            </a:r>
+            <a:endParaRPr lang="en-US" dirty="0"/>
+          </a:p>
+          <a:p>
+            <a:r>
+              <a:rPr lang="en-US" dirty="0" smtClean="0"/>
+              <a:t>Tests:</a:t>
+            </a:r>
+          </a:p>
+          <a:p>
+            <a:pPr lvl="1"/>
+            <a:r>
+              <a:rPr lang="en-US" dirty="0" smtClean="0"/>
+              <a:t>Unit tests: [??] </a:t>
+            </a:r>
+          </a:p>
+          <a:p>
+            <a:pPr lvl="1"/>
+            <a:r>
+              <a:rPr lang="en-US" dirty="0" smtClean="0"/>
+              <a:t>Test cases: [??] </a:t>
+            </a:r>
+          </a:p>
+          <a:p>
+            <a:pPr lvl="1"/>
+            <a:r>
+              <a:rPr lang="en-US" dirty="0" smtClean="0"/>
+              <a:t>Assertions: [??] </a:t>
+            </a:r>
+          </a:p>
+          <a:p>
+            <a:endParaRPr lang="en-US" dirty="0"/>
+          </a:p>
+          <a:p>
             <a:endParaRPr lang="en-CA" dirty="0"/>
           </a:p>
         </p:txBody>
@@ -6547,7 +5501,31 @@
           <a:p>
             <a:r>
               <a:rPr lang="en-US" dirty="0" smtClean="0"/>
-              <a:t>Project Evaluation and Metrics</a:t>
+              <a:t>What </a:t>
+            </a:r>
+            <a:r>
+              <a:rPr lang="en-US" dirty="0" smtClean="0"/>
+              <a:t>Did </a:t>
+            </a:r>
+            <a:r>
+              <a:rPr lang="en-US" dirty="0" smtClean="0"/>
+              <a:t>W</a:t>
+            </a:r>
+            <a:r>
+              <a:rPr lang="en-US" dirty="0" smtClean="0"/>
+              <a:t>e </a:t>
+            </a:r>
+            <a:r>
+              <a:rPr lang="en-US" dirty="0" smtClean="0"/>
+              <a:t>L</a:t>
+            </a:r>
+            <a:r>
+              <a:rPr lang="en-US" dirty="0" smtClean="0"/>
+              <a:t>earn</a:t>
+            </a:r>
+            <a:r>
+              <a:rPr lang="en-US" dirty="0" smtClean="0"/>
+              <a:t>?</a:t>
             </a:r>
             <a:endParaRPr lang="en-CA" dirty="0"/>
           </a:p>
@@ -6574,116 +5552,32 @@
           </a:ln>
         </p:spPr>
         <p:txBody>
-          <a:bodyPr>
-            <a:normAutofit fontScale="85000" lnSpcReduction="20000"/>
-          </a:bodyPr>
-          <a:lstStyle/>
-          <a:p>
-            <a:r>
-              <a:rPr lang="en-US" dirty="0" smtClean="0"/>
-              <a:t>Time spent: (1 unit = 15 minutes)</a:t>
-            </a:r>
-          </a:p>
-          <a:p>
-            <a:r>
-              <a:rPr lang="en-US" dirty="0" smtClean="0"/>
-              <a:t>Total time:  </a:t>
-            </a:r>
-            <a:r>
-              <a:rPr lang="en-US" dirty="0" smtClean="0"/>
-              <a:t>[??] units</a:t>
+          <a:bodyPr/>
+          <a:lstStyle/>
+          <a:p>
+            <a:r>
+              <a:rPr lang="en-US" dirty="0" smtClean="0"/>
+              <a:t>M</a:t>
+            </a:r>
+            <a:r>
+              <a:rPr lang="en-US" dirty="0" smtClean="0"/>
+              <a:t>ore experienced with </a:t>
+            </a:r>
+            <a:r>
+              <a:rPr lang="en-US" dirty="0" err="1" smtClean="0"/>
+              <a:t>RoR</a:t>
             </a:r>
             <a:endParaRPr lang="en-US" dirty="0" smtClean="0"/>
           </a:p>
           <a:p>
-            <a:endParaRPr lang="en-US" dirty="0"/>
-          </a:p>
-          <a:p>
-            <a:r>
-              <a:rPr lang="en-US" dirty="0" smtClean="0"/>
-              <a:t>Coding:</a:t>
-            </a:r>
-          </a:p>
-          <a:p>
-            <a:pPr lvl="1"/>
-            <a:r>
-              <a:rPr lang="en-US" dirty="0" smtClean="0"/>
-              <a:t>Models: </a:t>
-            </a:r>
-            <a:r>
-              <a:rPr lang="en-US" dirty="0" smtClean="0"/>
-              <a:t>[??] </a:t>
+            <a:r>
+              <a:rPr lang="en-CA" dirty="0" smtClean="0"/>
+              <a:t>Improved planning</a:t>
             </a:r>
             <a:endParaRPr lang="en-US" dirty="0" smtClean="0"/>
           </a:p>
           <a:p>
-            <a:pPr lvl="1"/>
-            <a:r>
-              <a:rPr lang="en-US" dirty="0" smtClean="0"/>
-              <a:t>Views: </a:t>
-            </a:r>
-            <a:r>
-              <a:rPr lang="en-US" dirty="0" smtClean="0"/>
-              <a:t>[??] </a:t>
-            </a:r>
             <a:endParaRPr lang="en-US" dirty="0" smtClean="0"/>
-          </a:p>
-          <a:p>
-            <a:pPr lvl="1"/>
-            <a:r>
-              <a:rPr lang="en-US" dirty="0" smtClean="0"/>
-              <a:t>Controllers: </a:t>
-            </a:r>
-            <a:r>
-              <a:rPr lang="en-US" dirty="0" smtClean="0"/>
-              <a:t>[??] </a:t>
-            </a:r>
-            <a:endParaRPr lang="en-US" dirty="0"/>
-          </a:p>
-          <a:p>
-            <a:r>
-              <a:rPr lang="en-US" dirty="0" smtClean="0"/>
-              <a:t>Tests:</a:t>
-            </a:r>
-          </a:p>
-          <a:p>
-            <a:pPr lvl="1"/>
-            <a:r>
-              <a:rPr lang="en-US" dirty="0" smtClean="0"/>
-              <a:t>Unit tests: </a:t>
-            </a:r>
-            <a:r>
-              <a:rPr lang="en-US" dirty="0" smtClean="0"/>
-              <a:t>[??] </a:t>
-            </a:r>
-            <a:endParaRPr lang="en-US" dirty="0" smtClean="0"/>
-          </a:p>
-          <a:p>
-            <a:pPr lvl="1"/>
-            <a:r>
-              <a:rPr lang="en-US" dirty="0" smtClean="0"/>
-              <a:t>Test cases: </a:t>
-            </a:r>
-            <a:r>
-              <a:rPr lang="en-US" dirty="0" smtClean="0"/>
-              <a:t>[??] </a:t>
-            </a:r>
-            <a:endParaRPr lang="en-US" dirty="0" smtClean="0"/>
-          </a:p>
-          <a:p>
-            <a:pPr lvl="1"/>
-            <a:r>
-              <a:rPr lang="en-US" dirty="0" smtClean="0"/>
-              <a:t>Assertions: </a:t>
-            </a:r>
-            <a:r>
-              <a:rPr lang="en-US" dirty="0" smtClean="0"/>
-              <a:t>[??] </a:t>
-            </a:r>
-            <a:endParaRPr lang="en-US" dirty="0" smtClean="0"/>
-          </a:p>
-          <a:p>
-            <a:endParaRPr lang="en-US" dirty="0"/>
           </a:p>
           <a:p>
             <a:endParaRPr lang="en-CA" dirty="0"/>
@@ -6741,7 +5635,7 @@
           <a:p>
             <a:r>
               <a:rPr lang="en-US" dirty="0" smtClean="0"/>
-              <a:t>What did we learn?</a:t>
+              <a:t>Issues and Project Difficulties</a:t>
             </a:r>
             <a:endParaRPr lang="en-CA" dirty="0"/>
           </a:p>
@@ -6773,11 +5667,14 @@
           <a:p>
             <a:r>
               <a:rPr lang="en-US" dirty="0" smtClean="0"/>
-              <a:t>??</a:t>
-            </a:r>
-            <a:endParaRPr lang="en-US" dirty="0" smtClean="0"/>
-          </a:p>
-          <a:p>
+              <a:t>Time constraints</a:t>
+            </a:r>
+          </a:p>
+          <a:p>
+            <a:r>
+              <a:rPr lang="en-US" smtClean="0"/>
+              <a:t>Equipment delays</a:t>
+            </a:r>
             <a:endParaRPr lang="en-CA" dirty="0"/>
           </a:p>
         </p:txBody>
@@ -6833,7 +5730,7 @@
           <a:p>
             <a:r>
               <a:rPr lang="en-US" dirty="0" smtClean="0"/>
-              <a:t>Issues and Project Difficulties</a:t>
+              <a:t>Summary</a:t>
             </a:r>
             <a:endParaRPr lang="en-CA" dirty="0"/>
           </a:p>
@@ -6864,16 +5761,11 @@
           <a:lstStyle/>
           <a:p>
             <a:r>
-              <a:rPr lang="en-US" dirty="0" smtClean="0"/>
-              <a:t>Time constraints</a:t>
-            </a:r>
-            <a:endParaRPr lang="en-US" dirty="0" smtClean="0"/>
-          </a:p>
-          <a:p>
-            <a:r>
-              <a:rPr lang="en-US" smtClean="0"/>
-              <a:t>Equipment delays</a:t>
-            </a:r>
+              <a:rPr lang="en-CA" dirty="0" smtClean="0"/>
+              <a:t>Completed key features</a:t>
+            </a:r>
+          </a:p>
+          <a:p>
             <a:endParaRPr lang="en-CA" dirty="0"/>
           </a:p>
         </p:txBody>
@@ -6929,7 +5821,7 @@
           <a:p>
             <a:r>
               <a:rPr lang="en-US" dirty="0" smtClean="0"/>
-              <a:t>Summary</a:t>
+              <a:t>Acknowledgements</a:t>
             </a:r>
             <a:endParaRPr lang="en-CA" dirty="0"/>
           </a:p>
@@ -6962,99 +5854,10 @@
             <a:pPr>
               <a:buNone/>
             </a:pPr>
-            <a:endParaRPr lang="en-CA" dirty="0"/>
-          </a:p>
-        </p:txBody>
-      </p:sp>
-    </p:spTree>
-  </p:cSld>
-  <p:clrMapOvr>
-    <a:masterClrMapping/>
-  </p:clrMapOvr>
-</p:sld>
-</file>
-
-<file path=ppt/slides/slide19.xml><?xml version="1.0" encoding="utf-8"?>
-<p:sld xmlns:a="http://schemas.openxmlformats.org/drawingml/2006/main" xmlns:r="http://schemas.openxmlformats.org/officeDocument/2006/relationships" xmlns:p="http://schemas.openxmlformats.org/presentationml/2006/main">
-  <p:cSld>
-    <p:spTree>
-      <p:nvGrpSpPr>
-        <p:cNvPr id="1" name=""/>
-        <p:cNvGrpSpPr/>
-        <p:nvPr/>
-      </p:nvGrpSpPr>
-      <p:grpSpPr>
-        <a:xfrm>
-          <a:off x="0" y="0"/>
-          <a:ext cx="0" cy="0"/>
-          <a:chOff x="0" y="0"/>
-          <a:chExt cx="0" cy="0"/>
-        </a:xfrm>
-      </p:grpSpPr>
-      <p:sp>
-        <p:nvSpPr>
-          <p:cNvPr id="2" name="Title 1"/>
-          <p:cNvSpPr>
-            <a:spLocks noGrp="1"/>
-          </p:cNvSpPr>
-          <p:nvPr>
-            <p:ph type="title"/>
-          </p:nvPr>
-        </p:nvSpPr>
-        <p:spPr>
-          <a:solidFill>
-            <a:srgbClr val="000000"/>
-          </a:solidFill>
-          <a:ln>
-            <a:solidFill>
-              <a:schemeClr val="accent1"/>
-            </a:solidFill>
-          </a:ln>
-        </p:spPr>
-        <p:txBody>
-          <a:bodyPr/>
-          <a:lstStyle/>
-          <a:p>
-            <a:r>
-              <a:rPr lang="en-US" dirty="0" smtClean="0"/>
-              <a:t>Acknowledgements</a:t>
-            </a:r>
-            <a:endParaRPr lang="en-CA" dirty="0"/>
-          </a:p>
-        </p:txBody>
-      </p:sp>
-      <p:sp>
-        <p:nvSpPr>
-          <p:cNvPr id="3" name="Content Placeholder 2"/>
-          <p:cNvSpPr>
-            <a:spLocks noGrp="1"/>
-          </p:cNvSpPr>
-          <p:nvPr>
-            <p:ph idx="1"/>
-          </p:nvPr>
-        </p:nvSpPr>
-        <p:spPr>
-          <a:solidFill>
-            <a:srgbClr val="000000"/>
-          </a:solidFill>
-          <a:ln>
-            <a:solidFill>
-              <a:schemeClr val="accent1"/>
-            </a:solidFill>
-          </a:ln>
-        </p:spPr>
-        <p:txBody>
-          <a:bodyPr/>
-          <a:lstStyle/>
-          <a:p>
-            <a:pPr>
-              <a:buNone/>
-            </a:pPr>
             <a:r>
               <a:rPr lang="en-CA" dirty="0" smtClean="0"/>
               <a:t>Thanks to the following:</a:t>
             </a:r>
-            <a:endParaRPr lang="en-CA" dirty="0" smtClean="0"/>
           </a:p>
           <a:p>
             <a:pPr lvl="1"/>
@@ -7219,7 +6022,6 @@
               <a:rPr lang="en-US" dirty="0" smtClean="0"/>
               <a:t>Why is it needed?</a:t>
             </a:r>
-            <a:endParaRPr lang="en-US" dirty="0" smtClean="0"/>
           </a:p>
           <a:p>
             <a:pPr lvl="1"/>
@@ -7247,184 +6049,6 @@
       </p:par>
     </p:tnLst>
   </p:timing>
-</p:sld>
-</file>
-
-<file path=ppt/slides/slide20.xml><?xml version="1.0" encoding="utf-8"?>
-<p:sld xmlns:a="http://schemas.openxmlformats.org/drawingml/2006/main" xmlns:r="http://schemas.openxmlformats.org/officeDocument/2006/relationships" xmlns:p="http://schemas.openxmlformats.org/presentationml/2006/main">
-  <p:cSld>
-    <p:spTree>
-      <p:nvGrpSpPr>
-        <p:cNvPr id="1" name=""/>
-        <p:cNvGrpSpPr/>
-        <p:nvPr/>
-      </p:nvGrpSpPr>
-      <p:grpSpPr>
-        <a:xfrm>
-          <a:off x="0" y="0"/>
-          <a:ext cx="0" cy="0"/>
-          <a:chOff x="0" y="0"/>
-          <a:chExt cx="0" cy="0"/>
-        </a:xfrm>
-      </p:grpSpPr>
-      <p:sp>
-        <p:nvSpPr>
-          <p:cNvPr id="2" name="Title 1"/>
-          <p:cNvSpPr>
-            <a:spLocks noGrp="1"/>
-          </p:cNvSpPr>
-          <p:nvPr>
-            <p:ph type="title"/>
-          </p:nvPr>
-        </p:nvSpPr>
-        <p:spPr>
-          <a:solidFill>
-            <a:srgbClr val="000000"/>
-          </a:solidFill>
-          <a:ln>
-            <a:solidFill>
-              <a:schemeClr val="accent1"/>
-            </a:solidFill>
-          </a:ln>
-        </p:spPr>
-        <p:txBody>
-          <a:bodyPr/>
-          <a:lstStyle/>
-          <a:p>
-            <a:r>
-              <a:rPr lang="en-US" dirty="0" smtClean="0"/>
-              <a:t>Demonstrations</a:t>
-            </a:r>
-            <a:endParaRPr lang="en-CA" dirty="0"/>
-          </a:p>
-        </p:txBody>
-      </p:sp>
-      <p:sp>
-        <p:nvSpPr>
-          <p:cNvPr id="3" name="Content Placeholder 2"/>
-          <p:cNvSpPr>
-            <a:spLocks noGrp="1"/>
-          </p:cNvSpPr>
-          <p:nvPr>
-            <p:ph idx="1"/>
-          </p:nvPr>
-        </p:nvSpPr>
-        <p:spPr>
-          <a:noFill/>
-          <a:ln>
-            <a:noFill/>
-          </a:ln>
-        </p:spPr>
-        <p:txBody>
-          <a:bodyPr>
-            <a:normAutofit lnSpcReduction="10000"/>
-          </a:bodyPr>
-          <a:lstStyle/>
-          <a:p>
-            <a:pPr algn="ctr">
-              <a:buNone/>
-            </a:pPr>
-            <a:r>
-              <a:rPr lang="en-US" sz="32000" dirty="0" smtClean="0"/>
-              <a:t>!</a:t>
-            </a:r>
-            <a:endParaRPr lang="en-CA" sz="32000" dirty="0" smtClean="0"/>
-          </a:p>
-          <a:p>
-            <a:endParaRPr lang="en-CA" dirty="0"/>
-          </a:p>
-        </p:txBody>
-      </p:sp>
-    </p:spTree>
-  </p:cSld>
-  <p:clrMapOvr>
-    <a:masterClrMapping/>
-  </p:clrMapOvr>
-</p:sld>
-</file>
-
-<file path=ppt/slides/slide21.xml><?xml version="1.0" encoding="utf-8"?>
-<p:sld xmlns:a="http://schemas.openxmlformats.org/drawingml/2006/main" xmlns:r="http://schemas.openxmlformats.org/officeDocument/2006/relationships" xmlns:p="http://schemas.openxmlformats.org/presentationml/2006/main">
-  <p:cSld>
-    <p:spTree>
-      <p:nvGrpSpPr>
-        <p:cNvPr id="1" name=""/>
-        <p:cNvGrpSpPr/>
-        <p:nvPr/>
-      </p:nvGrpSpPr>
-      <p:grpSpPr>
-        <a:xfrm>
-          <a:off x="0" y="0"/>
-          <a:ext cx="0" cy="0"/>
-          <a:chOff x="0" y="0"/>
-          <a:chExt cx="0" cy="0"/>
-        </a:xfrm>
-      </p:grpSpPr>
-      <p:sp>
-        <p:nvSpPr>
-          <p:cNvPr id="2" name="Title 1"/>
-          <p:cNvSpPr>
-            <a:spLocks noGrp="1"/>
-          </p:cNvSpPr>
-          <p:nvPr>
-            <p:ph type="title"/>
-          </p:nvPr>
-        </p:nvSpPr>
-        <p:spPr>
-          <a:solidFill>
-            <a:srgbClr val="000000"/>
-          </a:solidFill>
-          <a:ln>
-            <a:solidFill>
-              <a:schemeClr val="accent1"/>
-            </a:solidFill>
-          </a:ln>
-        </p:spPr>
-        <p:txBody>
-          <a:bodyPr/>
-          <a:lstStyle/>
-          <a:p>
-            <a:r>
-              <a:rPr lang="en-US" dirty="0" smtClean="0"/>
-              <a:t>Questions</a:t>
-            </a:r>
-            <a:endParaRPr lang="en-CA" dirty="0"/>
-          </a:p>
-        </p:txBody>
-      </p:sp>
-      <p:sp>
-        <p:nvSpPr>
-          <p:cNvPr id="3" name="Content Placeholder 2"/>
-          <p:cNvSpPr>
-            <a:spLocks noGrp="1"/>
-          </p:cNvSpPr>
-          <p:nvPr>
-            <p:ph idx="1"/>
-          </p:nvPr>
-        </p:nvSpPr>
-        <p:spPr/>
-        <p:txBody>
-          <a:bodyPr>
-            <a:noAutofit/>
-          </a:bodyPr>
-          <a:lstStyle/>
-          <a:p>
-            <a:pPr algn="ctr">
-              <a:buNone/>
-            </a:pPr>
-            <a:r>
-              <a:rPr lang="en-US" sz="32000" dirty="0" smtClean="0"/>
-              <a:t>?</a:t>
-            </a:r>
-            <a:endParaRPr lang="en-CA" sz="32000" dirty="0"/>
-          </a:p>
-        </p:txBody>
-      </p:sp>
-    </p:spTree>
-  </p:cSld>
-  <p:clrMapOvr>
-    <a:masterClrMapping/>
-  </p:clrMapOvr>
 </p:sld>
 </file>
 
@@ -7511,26 +6135,17 @@
               <a:rPr lang="en-US" dirty="0" smtClean="0"/>
               <a:t>Authentication and authorization</a:t>
             </a:r>
-            <a:endParaRPr lang="en-US" dirty="0" smtClean="0"/>
-          </a:p>
-          <a:p>
-            <a:r>
-              <a:rPr lang="en-US" dirty="0" smtClean="0"/>
-              <a:t>Optional </a:t>
-            </a:r>
-            <a:r>
-              <a:rPr lang="en-US" dirty="0" smtClean="0"/>
-              <a:t>SSL</a:t>
-            </a:r>
-          </a:p>
-          <a:p>
-            <a:r>
-              <a:rPr lang="en-US" dirty="0" smtClean="0"/>
-              <a:t>Online </a:t>
-            </a:r>
-            <a:r>
-              <a:rPr lang="en-US" dirty="0" smtClean="0"/>
-              <a:t>help</a:t>
+          </a:p>
+          <a:p>
+            <a:r>
+              <a:rPr lang="en-US" dirty="0" smtClean="0"/>
+              <a:t>Optional SSL</a:t>
+            </a:r>
+          </a:p>
+          <a:p>
+            <a:r>
+              <a:rPr lang="en-US" dirty="0" smtClean="0"/>
+              <a:t>Online help</a:t>
             </a:r>
           </a:p>
           <a:p>
@@ -7637,32 +6252,29 @@
             </a:r>
             <a:r>
               <a:rPr lang="en-US" dirty="0" smtClean="0"/>
-              <a:t>theirs.</a:t>
+              <a:t>theirs</a:t>
             </a:r>
             <a:endParaRPr lang="en-US" dirty="0"/>
           </a:p>
           <a:p>
             <a:r>
               <a:rPr lang="en-US" dirty="0" smtClean="0"/>
-              <a:t>Currently use </a:t>
-            </a:r>
-            <a:r>
-              <a:rPr lang="en-US" dirty="0" smtClean="0"/>
-              <a:t>a </a:t>
-            </a:r>
-            <a:r>
-              <a:rPr lang="en-US" dirty="0" smtClean="0"/>
-              <a:t>manual </a:t>
-            </a:r>
-            <a:r>
-              <a:rPr lang="en-US" dirty="0" smtClean="0"/>
-              <a:t>process.</a:t>
-            </a:r>
+              <a:t>Currently use a manual </a:t>
+            </a:r>
+            <a:r>
+              <a:rPr lang="en-US" dirty="0" smtClean="0"/>
+              <a:t>process</a:t>
+            </a:r>
+            <a:endParaRPr lang="en-US" dirty="0" smtClean="0"/>
           </a:p>
           <a:p>
             <a:r>
               <a:rPr lang="en-CA" dirty="0" smtClean="0"/>
-              <a:t>Had good initial communication.</a:t>
+              <a:t>Had good initial </a:t>
+            </a:r>
+            <a:r>
+              <a:rPr lang="en-CA" dirty="0" smtClean="0"/>
+              <a:t>communication</a:t>
             </a:r>
             <a:endParaRPr lang="en-US" dirty="0" smtClean="0"/>
           </a:p>
@@ -7761,37 +6373,19 @@
           <a:p>
             <a:r>
               <a:rPr lang="en-US" dirty="0" smtClean="0"/>
-              <a:t>Telescope: </a:t>
-            </a:r>
-            <a:r>
-              <a:rPr lang="en-US" dirty="0" smtClean="0"/>
-              <a:t>Meade ETX-60AT-TC</a:t>
-            </a:r>
-            <a:endParaRPr lang="en-US" dirty="0" smtClean="0"/>
-          </a:p>
-          <a:p>
-            <a:r>
-              <a:rPr lang="en-US" dirty="0" smtClean="0"/>
-              <a:t>Digital camera</a:t>
-            </a:r>
-            <a:r>
-              <a:rPr lang="en-US" dirty="0" smtClean="0"/>
-              <a:t>: Canon 30D</a:t>
-            </a:r>
-            <a:endParaRPr lang="en-US" dirty="0" smtClean="0"/>
-          </a:p>
-          <a:p>
-            <a:r>
-              <a:rPr lang="en-US" dirty="0" smtClean="0"/>
-              <a:t>Mobile device: Nokia </a:t>
-            </a:r>
-            <a:r>
-              <a:rPr lang="en-US" dirty="0" smtClean="0"/>
-              <a:t>N97, </a:t>
-            </a:r>
-            <a:r>
-              <a:rPr lang="en-US" dirty="0" smtClean="0"/>
-              <a:t>Apple </a:t>
+              <a:t>Telescope: Meade ETX-60AT-TC</a:t>
+            </a:r>
+          </a:p>
+          <a:p>
+            <a:r>
+              <a:rPr lang="en-US" dirty="0" smtClean="0"/>
+              <a:t>Digital camera: Canon 30D</a:t>
+            </a:r>
+          </a:p>
+          <a:p>
+            <a:r>
+              <a:rPr lang="en-US" dirty="0" smtClean="0"/>
+              <a:t>Mobile device: Nokia N97, Apple </a:t>
             </a:r>
             <a:r>
               <a:rPr lang="en-US" dirty="0" err="1" smtClean="0"/>
@@ -7901,29 +6495,20 @@
             </a:r>
             <a:r>
               <a:rPr lang="en-US" dirty="0" smtClean="0"/>
-              <a:t>Word and Project</a:t>
+              <a:t>Word, Project</a:t>
             </a:r>
             <a:endParaRPr lang="en-US" dirty="0" smtClean="0"/>
           </a:p>
           <a:p>
             <a:r>
               <a:rPr lang="en-US" dirty="0" smtClean="0"/>
-              <a:t>Modeling: </a:t>
-            </a:r>
-            <a:r>
-              <a:rPr lang="en-US" dirty="0" smtClean="0"/>
-              <a:t>Rational Rose</a:t>
-            </a:r>
-            <a:endParaRPr lang="en-US" dirty="0" smtClean="0"/>
-          </a:p>
-          <a:p>
-            <a:r>
-              <a:rPr lang="en-US" dirty="0" smtClean="0"/>
-              <a:t>Ruby on Rails IDE</a:t>
-            </a:r>
-            <a:r>
-              <a:rPr lang="en-US" dirty="0" smtClean="0"/>
-              <a:t>: </a:t>
+              <a:t>Modeling: Rational Rose</a:t>
+            </a:r>
+          </a:p>
+          <a:p>
+            <a:r>
+              <a:rPr lang="en-US" dirty="0" smtClean="0"/>
+              <a:t>Ruby on Rails IDE: </a:t>
             </a:r>
             <a:r>
               <a:rPr lang="en-US" dirty="0" err="1" smtClean="0"/>
@@ -8155,11 +6740,11 @@
           <a:p>
             <a:r>
               <a:rPr lang="en-US" dirty="0" smtClean="0"/>
-              <a:t>Web </a:t>
-            </a:r>
-            <a:r>
-              <a:rPr lang="en-US" dirty="0" smtClean="0"/>
-              <a:t>Server Details</a:t>
+              <a:t>Web Server </a:t>
+            </a:r>
+            <a:r>
+              <a:rPr lang="en-US" dirty="0" smtClean="0"/>
+              <a:t>Machine Details</a:t>
             </a:r>
             <a:endParaRPr lang="en-CA" dirty="0"/>
           </a:p>
@@ -8193,31 +6778,19 @@
           <a:p>
             <a:r>
               <a:rPr lang="en-US" dirty="0" smtClean="0"/>
-              <a:t>Framework: Ruby on </a:t>
-            </a:r>
-            <a:r>
-              <a:rPr lang="en-US" dirty="0" smtClean="0"/>
-              <a:t>Rails</a:t>
-            </a:r>
-          </a:p>
-          <a:p>
-            <a:r>
-              <a:rPr lang="en-US" dirty="0" smtClean="0"/>
-              <a:t>Operating </a:t>
-            </a:r>
-            <a:r>
-              <a:rPr lang="en-US" dirty="0" smtClean="0"/>
-              <a:t>System: Fedora 11</a:t>
-            </a:r>
-          </a:p>
-          <a:p>
-            <a:r>
-              <a:rPr lang="en-US" dirty="0" smtClean="0"/>
-              <a:t>Web Server: </a:t>
-            </a:r>
-            <a:r>
-              <a:rPr lang="en-US" dirty="0" smtClean="0"/>
-              <a:t>Apache2</a:t>
+              <a:t>Framework: Ruby on Rails</a:t>
+            </a:r>
+          </a:p>
+          <a:p>
+            <a:r>
+              <a:rPr lang="en-US" dirty="0" smtClean="0"/>
+              <a:t>Operating System: Fedora 11</a:t>
+            </a:r>
+          </a:p>
+          <a:p>
+            <a:r>
+              <a:rPr lang="en-US" dirty="0" smtClean="0"/>
+              <a:t>Web Server: Apache2</a:t>
             </a:r>
             <a:endParaRPr lang="en-CA" dirty="0"/>
           </a:p>
@@ -8314,33 +6887,13 @@
           <a:p>
             <a:r>
               <a:rPr lang="en-US" dirty="0" smtClean="0"/>
-              <a:t>Operating </a:t>
-            </a:r>
-            <a:r>
-              <a:rPr lang="en-US" dirty="0" smtClean="0"/>
-              <a:t>System: </a:t>
-            </a:r>
-            <a:r>
-              <a:rPr lang="en-US" dirty="0" smtClean="0"/>
-              <a:t>Windows XP</a:t>
-            </a:r>
-          </a:p>
-          <a:p>
-            <a:r>
-              <a:rPr lang="en-US" dirty="0" smtClean="0"/>
-              <a:t>Database</a:t>
-            </a:r>
-            <a:r>
-              <a:rPr lang="en-US" dirty="0" smtClean="0"/>
-              <a:t>: </a:t>
-            </a:r>
-            <a:r>
-              <a:rPr lang="en-US" dirty="0" smtClean="0"/>
-              <a:t>Oracle 10g Express Editio</a:t>
-            </a:r>
-            <a:r>
-              <a:rPr lang="en-US" dirty="0" smtClean="0"/>
-              <a:t>n</a:t>
+              <a:t>Operating System: Windows XP</a:t>
+            </a:r>
+          </a:p>
+          <a:p>
+            <a:r>
+              <a:rPr lang="en-US" dirty="0" smtClean="0"/>
+              <a:t>Database: Oracle 10g Express Edition</a:t>
             </a:r>
             <a:endParaRPr lang="en-CA" dirty="0"/>
           </a:p>

</xml_diff>

<commit_message>
updated docs for meeting 5
</commit_message>
<xml_diff>
--- a/Stargazer_Presentation_Semester2.pptx
+++ b/Stargazer_Presentation_Semester2.pptx
@@ -210,7 +210,7 @@
             <a:fld id="{2AAFEF68-1DE9-47A7-9FE3-8BA9D24E7EE3}" type="datetimeFigureOut">
               <a:rPr lang="en-US" smtClean="0"/>
               <a:pPr/>
-              <a:t>3/29/2010</a:t>
+              <a:t>3/31/2010</a:t>
             </a:fld>
             <a:endParaRPr lang="en-CA"/>
           </a:p>
@@ -962,13 +962,8 @@
             </a:r>
             <a:r>
               <a:rPr lang="en-CA" baseline="0" dirty="0" smtClean="0"/>
-              <a:t> for giving us a domain name for our </a:t>
-            </a:r>
-            <a:r>
-              <a:rPr lang="en-CA" baseline="0" dirty="0" smtClean="0"/>
-              <a:t>project allowing outside access to our web server</a:t>
-            </a:r>
-            <a:endParaRPr lang="en-CA" baseline="0" dirty="0" smtClean="0"/>
+              <a:t> for giving us a domain name for our project allowing outside access to our web server</a:t>
+            </a:r>
           </a:p>
           <a:p>
             <a:r>
@@ -1915,7 +1910,7 @@
             <a:fld id="{471E1C79-A119-44DE-84CD-391F73B5F415}" type="datetimeFigureOut">
               <a:rPr lang="en-US" smtClean="0"/>
               <a:pPr/>
-              <a:t>3/29/2010</a:t>
+              <a:t>3/31/2010</a:t>
             </a:fld>
             <a:endParaRPr lang="en-CA"/>
           </a:p>
@@ -2082,7 +2077,7 @@
             <a:fld id="{471E1C79-A119-44DE-84CD-391F73B5F415}" type="datetimeFigureOut">
               <a:rPr lang="en-US" smtClean="0"/>
               <a:pPr/>
-              <a:t>3/29/2010</a:t>
+              <a:t>3/31/2010</a:t>
             </a:fld>
             <a:endParaRPr lang="en-CA"/>
           </a:p>
@@ -2259,7 +2254,7 @@
             <a:fld id="{471E1C79-A119-44DE-84CD-391F73B5F415}" type="datetimeFigureOut">
               <a:rPr lang="en-US" smtClean="0"/>
               <a:pPr/>
-              <a:t>3/29/2010</a:t>
+              <a:t>3/31/2010</a:t>
             </a:fld>
             <a:endParaRPr lang="en-CA"/>
           </a:p>
@@ -2426,7 +2421,7 @@
             <a:fld id="{471E1C79-A119-44DE-84CD-391F73B5F415}" type="datetimeFigureOut">
               <a:rPr lang="en-US" smtClean="0"/>
               <a:pPr/>
-              <a:t>3/29/2010</a:t>
+              <a:t>3/31/2010</a:t>
             </a:fld>
             <a:endParaRPr lang="en-CA"/>
           </a:p>
@@ -2669,7 +2664,7 @@
             <a:fld id="{471E1C79-A119-44DE-84CD-391F73B5F415}" type="datetimeFigureOut">
               <a:rPr lang="en-US" smtClean="0"/>
               <a:pPr/>
-              <a:t>3/29/2010</a:t>
+              <a:t>3/31/2010</a:t>
             </a:fld>
             <a:endParaRPr lang="en-CA"/>
           </a:p>
@@ -2954,7 +2949,7 @@
             <a:fld id="{471E1C79-A119-44DE-84CD-391F73B5F415}" type="datetimeFigureOut">
               <a:rPr lang="en-US" smtClean="0"/>
               <a:pPr/>
-              <a:t>3/29/2010</a:t>
+              <a:t>3/31/2010</a:t>
             </a:fld>
             <a:endParaRPr lang="en-CA"/>
           </a:p>
@@ -3373,7 +3368,7 @@
             <a:fld id="{471E1C79-A119-44DE-84CD-391F73B5F415}" type="datetimeFigureOut">
               <a:rPr lang="en-US" smtClean="0"/>
               <a:pPr/>
-              <a:t>3/29/2010</a:t>
+              <a:t>3/31/2010</a:t>
             </a:fld>
             <a:endParaRPr lang="en-CA"/>
           </a:p>
@@ -3488,7 +3483,7 @@
             <a:fld id="{471E1C79-A119-44DE-84CD-391F73B5F415}" type="datetimeFigureOut">
               <a:rPr lang="en-US" smtClean="0"/>
               <a:pPr/>
-              <a:t>3/29/2010</a:t>
+              <a:t>3/31/2010</a:t>
             </a:fld>
             <a:endParaRPr lang="en-CA"/>
           </a:p>
@@ -3580,7 +3575,7 @@
             <a:fld id="{471E1C79-A119-44DE-84CD-391F73B5F415}" type="datetimeFigureOut">
               <a:rPr lang="en-US" smtClean="0"/>
               <a:pPr/>
-              <a:t>3/29/2010</a:t>
+              <a:t>3/31/2010</a:t>
             </a:fld>
             <a:endParaRPr lang="en-CA"/>
           </a:p>
@@ -3854,7 +3849,7 @@
             <a:fld id="{471E1C79-A119-44DE-84CD-391F73B5F415}" type="datetimeFigureOut">
               <a:rPr lang="en-US" smtClean="0"/>
               <a:pPr/>
-              <a:t>3/29/2010</a:t>
+              <a:t>3/31/2010</a:t>
             </a:fld>
             <a:endParaRPr lang="en-CA"/>
           </a:p>
@@ -4104,7 +4099,7 @@
             <a:fld id="{471E1C79-A119-44DE-84CD-391F73B5F415}" type="datetimeFigureOut">
               <a:rPr lang="en-US" smtClean="0"/>
               <a:pPr/>
-              <a:t>3/29/2010</a:t>
+              <a:t>3/31/2010</a:t>
             </a:fld>
             <a:endParaRPr lang="en-CA"/>
           </a:p>
@@ -4323,7 +4318,7 @@
             <a:fld id="{471E1C79-A119-44DE-84CD-391F73B5F415}" type="datetimeFigureOut">
               <a:rPr lang="en-US" smtClean="0"/>
               <a:pPr/>
-              <a:t>3/29/2010</a:t>
+              <a:t>3/31/2010</a:t>
             </a:fld>
             <a:endParaRPr lang="en-CA"/>
           </a:p>
@@ -4788,13 +4783,8 @@
             </a:pPr>
             <a:r>
               <a:rPr lang="en-US" dirty="0" smtClean="0"/>
-              <a:t> Course: 		COSC </a:t>
-            </a:r>
-            <a:r>
-              <a:rPr lang="en-US" dirty="0" smtClean="0"/>
-              <a:t>470/471</a:t>
-            </a:r>
-            <a:endParaRPr lang="en-US" dirty="0" smtClean="0"/>
+              <a:t> Course: 		COSC 470/471</a:t>
+            </a:r>
           </a:p>
           <a:p>
             <a:pPr lvl="0" algn="l">
@@ -4901,11 +4891,7 @@
           <a:p>
             <a:r>
               <a:rPr lang="en-US" dirty="0" smtClean="0"/>
-              <a:t>Versioning </a:t>
-            </a:r>
-            <a:r>
-              <a:rPr lang="en-US" dirty="0" smtClean="0"/>
-              <a:t>Control: GIT</a:t>
+              <a:t>Versioning Control: GIT</a:t>
             </a:r>
             <a:endParaRPr lang="en-CA" dirty="0"/>
           </a:p>
@@ -5501,31 +5487,7 @@
           <a:p>
             <a:r>
               <a:rPr lang="en-US" dirty="0" smtClean="0"/>
-              <a:t>What </a:t>
-            </a:r>
-            <a:r>
-              <a:rPr lang="en-US" dirty="0" smtClean="0"/>
-              <a:t>Did </a:t>
-            </a:r>
-            <a:r>
-              <a:rPr lang="en-US" dirty="0" smtClean="0"/>
-              <a:t>W</a:t>
-            </a:r>
-            <a:r>
-              <a:rPr lang="en-US" dirty="0" smtClean="0"/>
-              <a:t>e </a:t>
-            </a:r>
-            <a:r>
-              <a:rPr lang="en-US" dirty="0" smtClean="0"/>
-              <a:t>L</a:t>
-            </a:r>
-            <a:r>
-              <a:rPr lang="en-US" dirty="0" smtClean="0"/>
-              <a:t>earn</a:t>
-            </a:r>
-            <a:r>
-              <a:rPr lang="en-US" dirty="0" smtClean="0"/>
-              <a:t>?</a:t>
+              <a:t>What Did We Learn?</a:t>
             </a:r>
             <a:endParaRPr lang="en-CA" dirty="0"/>
           </a:p>
@@ -5557,15 +5519,11 @@
           <a:p>
             <a:r>
               <a:rPr lang="en-US" dirty="0" smtClean="0"/>
-              <a:t>M</a:t>
+              <a:t>More experienced with </a:t>
             </a:r>
             <a:r>
               <a:rPr lang="en-US" dirty="0" smtClean="0"/>
-              <a:t>ore experienced with </a:t>
-            </a:r>
-            <a:r>
-              <a:rPr lang="en-US" dirty="0" err="1" smtClean="0"/>
-              <a:t>RoR</a:t>
+              <a:t>Ruby on Rails</a:t>
             </a:r>
             <a:endParaRPr lang="en-US" dirty="0" smtClean="0"/>
           </a:p>
@@ -5762,8 +5720,29 @@
           <a:p>
             <a:r>
               <a:rPr lang="en-CA" dirty="0" smtClean="0"/>
-              <a:t>Completed key features</a:t>
-            </a:r>
+              <a:t>Automatic Telescope Control System</a:t>
+            </a:r>
+          </a:p>
+          <a:p>
+            <a:r>
+              <a:rPr lang="en-CA" dirty="0" smtClean="0"/>
+              <a:t>Can:</a:t>
+            </a:r>
+          </a:p>
+          <a:p>
+            <a:pPr lvl="1"/>
+            <a:r>
+              <a:rPr lang="en-CA" dirty="0" smtClean="0"/>
+              <a:t>Schedule telescope for future dates</a:t>
+            </a:r>
+          </a:p>
+          <a:p>
+            <a:pPr lvl="1"/>
+            <a:r>
+              <a:rPr lang="en-CA" dirty="0" smtClean="0"/>
+              <a:t>Capture images of that area</a:t>
+            </a:r>
+            <a:endParaRPr lang="en-CA" dirty="0" smtClean="0"/>
           </a:p>
           <a:p>
             <a:endParaRPr lang="en-CA" dirty="0"/>
@@ -6248,33 +6227,20 @@
           <a:p>
             <a:r>
               <a:rPr lang="en-US" dirty="0" smtClean="0"/>
-              <a:t>Astronomy is a hobby of </a:t>
-            </a:r>
+              <a:t>Astronomy is a hobby of theirs</a:t>
+            </a:r>
+            <a:endParaRPr lang="en-US" dirty="0"/>
+          </a:p>
+          <a:p>
             <a:r>
               <a:rPr lang="en-US" dirty="0" smtClean="0"/>
-              <a:t>theirs</a:t>
-            </a:r>
-            <a:endParaRPr lang="en-US" dirty="0"/>
-          </a:p>
-          <a:p>
-            <a:r>
-              <a:rPr lang="en-US" dirty="0" smtClean="0"/>
-              <a:t>Currently use a manual </a:t>
-            </a:r>
-            <a:r>
-              <a:rPr lang="en-US" dirty="0" smtClean="0"/>
-              <a:t>process</a:t>
-            </a:r>
-            <a:endParaRPr lang="en-US" dirty="0" smtClean="0"/>
+              <a:t>Currently use a manual process</a:t>
+            </a:r>
           </a:p>
           <a:p>
             <a:r>
               <a:rPr lang="en-CA" dirty="0" smtClean="0"/>
-              <a:t>Had good initial </a:t>
-            </a:r>
-            <a:r>
-              <a:rPr lang="en-CA" dirty="0" smtClean="0"/>
-              <a:t>communication</a:t>
+              <a:t>Had good initial communication</a:t>
             </a:r>
             <a:endParaRPr lang="en-US" dirty="0" smtClean="0"/>
           </a:p>
@@ -6491,13 +6457,8 @@
           <a:p>
             <a:r>
               <a:rPr lang="en-US" dirty="0" smtClean="0"/>
-              <a:t>Documentation: Microsoft </a:t>
-            </a:r>
-            <a:r>
-              <a:rPr lang="en-US" dirty="0" smtClean="0"/>
-              <a:t>Word, Project</a:t>
-            </a:r>
-            <a:endParaRPr lang="en-US" dirty="0" smtClean="0"/>
+              <a:t>Documentation: Microsoft Word, Project</a:t>
+            </a:r>
           </a:p>
           <a:p>
             <a:r>
@@ -6519,25 +6480,16 @@
           <a:p>
             <a:r>
               <a:rPr lang="en-CA" dirty="0" smtClean="0"/>
-              <a:t>C# IDE: Microsoft Visual Studio</a:t>
-            </a:r>
-          </a:p>
-          <a:p>
-            <a:r>
-              <a:rPr lang="en-CA" dirty="0" smtClean="0"/>
-              <a:t>Time Tracking: </a:t>
-            </a:r>
-            <a:r>
-              <a:rPr lang="en-CA" dirty="0" err="1" smtClean="0"/>
-              <a:t>Anuko</a:t>
-            </a:r>
-            <a:r>
-              <a:rPr lang="en-CA" dirty="0" smtClean="0"/>
-              <a:t> Time Tracker</a:t>
-            </a:r>
-            <a:endParaRPr lang="en-US" dirty="0" smtClean="0"/>
-          </a:p>
-          <a:p>
+              <a:t>C# IDE: Microsoft </a:t>
+            </a:r>
+            <a:r>
+              <a:rPr lang="en-CA" smtClean="0"/>
+              <a:t>Visual </a:t>
+            </a:r>
+            <a:r>
+              <a:rPr lang="en-CA" smtClean="0"/>
+              <a:t>Studio</a:t>
+            </a:r>
             <a:endParaRPr lang="en-US" dirty="0" smtClean="0"/>
           </a:p>
           <a:p>
@@ -6740,11 +6692,7 @@
           <a:p>
             <a:r>
               <a:rPr lang="en-US" dirty="0" smtClean="0"/>
-              <a:t>Web Server </a:t>
-            </a:r>
-            <a:r>
-              <a:rPr lang="en-US" dirty="0" smtClean="0"/>
-              <a:t>Machine Details</a:t>
+              <a:t>Web Server Machine Details</a:t>
             </a:r>
             <a:endParaRPr lang="en-CA" dirty="0"/>
           </a:p>

</xml_diff>